<commit_message>
added many more slides
</commit_message>
<xml_diff>
--- a/presentation.pptx
+++ b/presentation.pptx
@@ -5,7 +5,7 @@
     <p:sldMasterId id="2147483756" r:id="rId1"/>
   </p:sldMasterIdLst>
   <p:notesMasterIdLst>
-    <p:notesMasterId r:id="rId7"/>
+    <p:notesMasterId r:id="rId16"/>
   </p:notesMasterIdLst>
   <p:sldIdLst>
     <p:sldId id="256" r:id="rId2"/>
@@ -13,6 +13,15 @@
     <p:sldId id="257" r:id="rId4"/>
     <p:sldId id="259" r:id="rId5"/>
     <p:sldId id="258" r:id="rId6"/>
+    <p:sldId id="261" r:id="rId7"/>
+    <p:sldId id="264" r:id="rId8"/>
+    <p:sldId id="262" r:id="rId9"/>
+    <p:sldId id="263" r:id="rId10"/>
+    <p:sldId id="265" r:id="rId11"/>
+    <p:sldId id="267" r:id="rId12"/>
+    <p:sldId id="268" r:id="rId13"/>
+    <p:sldId id="266" r:id="rId14"/>
+    <p:sldId id="269" r:id="rId15"/>
   </p:sldIdLst>
   <p:sldSz cx="9144000" cy="6858000" type="screen4x3"/>
   <p:notesSz cx="6858000" cy="9144000"/>
@@ -462,6 +471,371 @@
     </a:lvl9pPr>
   </p:notesStyle>
 </p:notesMaster>
+</file>
+
+<file path=ppt/notesSlides/notesSlide1.xml><?xml version="1.0" encoding="utf-8"?>
+<p:notes xmlns:a="http://schemas.openxmlformats.org/drawingml/2006/main" xmlns:r="http://schemas.openxmlformats.org/officeDocument/2006/relationships" xmlns:p="http://schemas.openxmlformats.org/presentationml/2006/main">
+  <p:cSld>
+    <p:spTree>
+      <p:nvGrpSpPr>
+        <p:cNvPr id="1" name=""/>
+        <p:cNvGrpSpPr/>
+        <p:nvPr/>
+      </p:nvGrpSpPr>
+      <p:grpSpPr>
+        <a:xfrm>
+          <a:off x="0" y="0"/>
+          <a:ext cx="0" cy="0"/>
+          <a:chOff x="0" y="0"/>
+          <a:chExt cx="0" cy="0"/>
+        </a:xfrm>
+      </p:grpSpPr>
+      <p:sp>
+        <p:nvSpPr>
+          <p:cNvPr id="2" name="Slide Image Placeholder 1"/>
+          <p:cNvSpPr>
+            <a:spLocks noGrp="1" noRot="1" noChangeAspect="1"/>
+          </p:cNvSpPr>
+          <p:nvPr>
+            <p:ph type="sldImg"/>
+          </p:nvPr>
+        </p:nvSpPr>
+        <p:spPr/>
+      </p:sp>
+      <p:sp>
+        <p:nvSpPr>
+          <p:cNvPr id="3" name="Notes Placeholder 2"/>
+          <p:cNvSpPr>
+            <a:spLocks noGrp="1"/>
+          </p:cNvSpPr>
+          <p:nvPr>
+            <p:ph type="body" idx="1"/>
+          </p:nvPr>
+        </p:nvSpPr>
+        <p:spPr/>
+        <p:txBody>
+          <a:bodyPr/>
+          <a:lstStyle/>
+          <a:p>
+            <a:pPr algn="l" rtl="0"/>
+            <a:endParaRPr lang="he-IL" dirty="0"/>
+          </a:p>
+        </p:txBody>
+      </p:sp>
+      <p:sp>
+        <p:nvSpPr>
+          <p:cNvPr id="4" name="Slide Number Placeholder 3"/>
+          <p:cNvSpPr>
+            <a:spLocks noGrp="1"/>
+          </p:cNvSpPr>
+          <p:nvPr>
+            <p:ph type="sldNum" sz="quarter" idx="10"/>
+          </p:nvPr>
+        </p:nvSpPr>
+        <p:spPr/>
+        <p:txBody>
+          <a:bodyPr/>
+          <a:lstStyle/>
+          <a:p>
+            <a:fld id="{BA5E136A-2557-4D52-A633-356126B11F1A}" type="slidenum">
+              <a:rPr lang="he-IL" smtClean="0"/>
+              <a:t>7</a:t>
+            </a:fld>
+            <a:endParaRPr lang="he-IL"/>
+          </a:p>
+        </p:txBody>
+      </p:sp>
+    </p:spTree>
+    <p:extLst>
+      <p:ext uri="{BB962C8B-B14F-4D97-AF65-F5344CB8AC3E}">
+        <p14:creationId xmlns:p14="http://schemas.microsoft.com/office/powerpoint/2010/main" val="3565334790"/>
+      </p:ext>
+    </p:extLst>
+  </p:cSld>
+  <p:clrMapOvr>
+    <a:masterClrMapping/>
+  </p:clrMapOvr>
+</p:notes>
+</file>
+
+<file path=ppt/notesSlides/notesSlide2.xml><?xml version="1.0" encoding="utf-8"?>
+<p:notes xmlns:a="http://schemas.openxmlformats.org/drawingml/2006/main" xmlns:r="http://schemas.openxmlformats.org/officeDocument/2006/relationships" xmlns:p="http://schemas.openxmlformats.org/presentationml/2006/main">
+  <p:cSld>
+    <p:spTree>
+      <p:nvGrpSpPr>
+        <p:cNvPr id="1" name=""/>
+        <p:cNvGrpSpPr/>
+        <p:nvPr/>
+      </p:nvGrpSpPr>
+      <p:grpSpPr>
+        <a:xfrm>
+          <a:off x="0" y="0"/>
+          <a:ext cx="0" cy="0"/>
+          <a:chOff x="0" y="0"/>
+          <a:chExt cx="0" cy="0"/>
+        </a:xfrm>
+      </p:grpSpPr>
+      <p:sp>
+        <p:nvSpPr>
+          <p:cNvPr id="2" name="Slide Image Placeholder 1"/>
+          <p:cNvSpPr>
+            <a:spLocks noGrp="1" noRot="1" noChangeAspect="1"/>
+          </p:cNvSpPr>
+          <p:nvPr>
+            <p:ph type="sldImg"/>
+          </p:nvPr>
+        </p:nvSpPr>
+        <p:spPr/>
+      </p:sp>
+      <p:sp>
+        <p:nvSpPr>
+          <p:cNvPr id="3" name="Notes Placeholder 2"/>
+          <p:cNvSpPr>
+            <a:spLocks noGrp="1"/>
+          </p:cNvSpPr>
+          <p:nvPr>
+            <p:ph type="body" idx="1"/>
+          </p:nvPr>
+        </p:nvSpPr>
+        <p:spPr/>
+        <p:txBody>
+          <a:bodyPr/>
+          <a:lstStyle/>
+          <a:p>
+            <a:pPr marL="0" marR="0" indent="0" algn="r" defTabSz="914400" rtl="1" eaLnBrk="1" fontAlgn="auto" latinLnBrk="0" hangingPunct="1">
+              <a:lnSpc>
+                <a:spcPct val="100000"/>
+              </a:lnSpc>
+              <a:spcBef>
+                <a:spcPts val="0"/>
+              </a:spcBef>
+              <a:spcAft>
+                <a:spcPts val="0"/>
+              </a:spcAft>
+              <a:buClrTx/>
+              <a:buSzTx/>
+              <a:buFontTx/>
+              <a:buNone/>
+              <a:tabLst/>
+              <a:defRPr/>
+            </a:pPr>
+            <a:r>
+              <a:rPr lang="en-US" sz="1200" dirty="0" smtClean="0">
+                <a:solidFill>
+                  <a:prstClr val="black"/>
+                </a:solidFill>
+              </a:rPr>
+              <a:t>SIM </a:t>
+            </a:r>
+            <a:r>
+              <a:rPr lang="el-GR" sz="1200" dirty="0" smtClean="0">
+                <a:solidFill>
+                  <a:prstClr val="black"/>
+                </a:solidFill>
+              </a:rPr>
+              <a:t>π</a:t>
+            </a:r>
+            <a:r>
+              <a:rPr lang="en-US" sz="1200" dirty="0" smtClean="0">
+                <a:solidFill>
+                  <a:prstClr val="black"/>
+                </a:solidFill>
+              </a:rPr>
+              <a:t>=1 </a:t>
+            </a:r>
+            <a:r>
+              <a:rPr lang="el-GR" sz="1200" dirty="0" smtClean="0">
+                <a:solidFill>
+                  <a:prstClr val="black"/>
+                </a:solidFill>
+              </a:rPr>
+              <a:t>τ</a:t>
+            </a:r>
+            <a:r>
+              <a:rPr lang="en-US" sz="1200" dirty="0" smtClean="0">
+                <a:solidFill>
+                  <a:prstClr val="black"/>
+                </a:solidFill>
+              </a:rPr>
+              <a:t>=10 vs. CM </a:t>
+            </a:r>
+            <a:r>
+              <a:rPr lang="el-GR" sz="1200" dirty="0" smtClean="0">
+                <a:solidFill>
+                  <a:prstClr val="black"/>
+                </a:solidFill>
+              </a:rPr>
+              <a:t>τ</a:t>
+            </a:r>
+            <a:r>
+              <a:rPr lang="en-US" sz="1200" dirty="0" smtClean="0">
+                <a:solidFill>
+                  <a:prstClr val="black"/>
+                </a:solidFill>
+              </a:rPr>
+              <a:t>=10; 60 replicates, SIM starts at 5% and wins in 40% (25/60, P&lt;10</a:t>
+            </a:r>
+            <a:r>
+              <a:rPr lang="en-US" sz="1200" baseline="30000" dirty="0" smtClean="0">
+                <a:solidFill>
+                  <a:prstClr val="black"/>
+                </a:solidFill>
+              </a:rPr>
+              <a:t>-16</a:t>
+            </a:r>
+            <a:r>
+              <a:rPr lang="en-US" sz="1200" dirty="0" smtClean="0">
+                <a:solidFill>
+                  <a:prstClr val="black"/>
+                </a:solidFill>
+              </a:rPr>
+              <a:t>)</a:t>
+            </a:r>
+            <a:endParaRPr lang="he-IL" dirty="0" smtClean="0"/>
+          </a:p>
+          <a:p>
+            <a:endParaRPr lang="he-IL" dirty="0"/>
+          </a:p>
+        </p:txBody>
+      </p:sp>
+      <p:sp>
+        <p:nvSpPr>
+          <p:cNvPr id="4" name="Slide Number Placeholder 3"/>
+          <p:cNvSpPr>
+            <a:spLocks noGrp="1"/>
+          </p:cNvSpPr>
+          <p:nvPr>
+            <p:ph type="sldNum" sz="quarter" idx="10"/>
+          </p:nvPr>
+        </p:nvSpPr>
+        <p:spPr/>
+        <p:txBody>
+          <a:bodyPr/>
+          <a:lstStyle/>
+          <a:p>
+            <a:fld id="{0188A1CC-280A-4CE2-BAFB-57E0AC91B311}" type="slidenum">
+              <a:rPr lang="he-IL" smtClean="0"/>
+              <a:t>12</a:t>
+            </a:fld>
+            <a:endParaRPr lang="he-IL"/>
+          </a:p>
+        </p:txBody>
+      </p:sp>
+    </p:spTree>
+    <p:extLst>
+      <p:ext uri="{BB962C8B-B14F-4D97-AF65-F5344CB8AC3E}">
+        <p14:creationId xmlns:p14="http://schemas.microsoft.com/office/powerpoint/2010/main" val="3613911528"/>
+      </p:ext>
+    </p:extLst>
+  </p:cSld>
+  <p:clrMapOvr>
+    <a:masterClrMapping/>
+  </p:clrMapOvr>
+</p:notes>
+</file>
+
+<file path=ppt/notesSlides/notesSlide3.xml><?xml version="1.0" encoding="utf-8"?>
+<p:notes xmlns:a="http://schemas.openxmlformats.org/drawingml/2006/main" xmlns:r="http://schemas.openxmlformats.org/officeDocument/2006/relationships" xmlns:p="http://schemas.openxmlformats.org/presentationml/2006/main">
+  <p:cSld>
+    <p:spTree>
+      <p:nvGrpSpPr>
+        <p:cNvPr id="1" name=""/>
+        <p:cNvGrpSpPr/>
+        <p:nvPr/>
+      </p:nvGrpSpPr>
+      <p:grpSpPr>
+        <a:xfrm>
+          <a:off x="0" y="0"/>
+          <a:ext cx="0" cy="0"/>
+          <a:chOff x="0" y="0"/>
+          <a:chExt cx="0" cy="0"/>
+        </a:xfrm>
+      </p:grpSpPr>
+      <p:sp>
+        <p:nvSpPr>
+          <p:cNvPr id="2" name="Slide Image Placeholder 1"/>
+          <p:cNvSpPr>
+            <a:spLocks noGrp="1" noRot="1" noChangeAspect="1"/>
+          </p:cNvSpPr>
+          <p:nvPr>
+            <p:ph type="sldImg"/>
+          </p:nvPr>
+        </p:nvSpPr>
+        <p:spPr/>
+      </p:sp>
+      <p:sp>
+        <p:nvSpPr>
+          <p:cNvPr id="3" name="Notes Placeholder 2"/>
+          <p:cNvSpPr>
+            <a:spLocks noGrp="1"/>
+          </p:cNvSpPr>
+          <p:nvPr>
+            <p:ph type="body" idx="1"/>
+          </p:nvPr>
+        </p:nvSpPr>
+        <p:spPr/>
+        <p:txBody>
+          <a:bodyPr/>
+          <a:lstStyle/>
+          <a:p>
+            <a:pPr marL="0" indent="0" algn="l" rtl="0">
+              <a:buNone/>
+            </a:pPr>
+            <a:r>
+              <a:rPr lang="en-US" sz="1200" dirty="0" smtClean="0">
+                <a:solidFill>
+                  <a:prstClr val="black"/>
+                </a:solidFill>
+              </a:rPr>
+              <a:t>SIM vs. CM, up to 500 generations, SIM starts at 5%, # replicates&gt;100, µ=0.003, error bars: ±1 SE, P&lt;0.001</a:t>
+            </a:r>
+            <a:endParaRPr lang="he-IL" sz="1200" dirty="0" smtClean="0"/>
+          </a:p>
+          <a:p>
+            <a:pPr marL="0" indent="0" algn="l" rtl="0">
+              <a:buNone/>
+            </a:pPr>
+            <a:endParaRPr lang="en-US" sz="1200" dirty="0" smtClean="0"/>
+          </a:p>
+          <a:p>
+            <a:endParaRPr lang="he-IL" dirty="0"/>
+          </a:p>
+        </p:txBody>
+      </p:sp>
+      <p:sp>
+        <p:nvSpPr>
+          <p:cNvPr id="4" name="Slide Number Placeholder 3"/>
+          <p:cNvSpPr>
+            <a:spLocks noGrp="1"/>
+          </p:cNvSpPr>
+          <p:nvPr>
+            <p:ph type="sldNum" sz="quarter" idx="10"/>
+          </p:nvPr>
+        </p:nvSpPr>
+        <p:spPr/>
+        <p:txBody>
+          <a:bodyPr/>
+          <a:lstStyle/>
+          <a:p>
+            <a:fld id="{0188A1CC-280A-4CE2-BAFB-57E0AC91B311}" type="slidenum">
+              <a:rPr lang="he-IL" smtClean="0"/>
+              <a:t>13</a:t>
+            </a:fld>
+            <a:endParaRPr lang="he-IL"/>
+          </a:p>
+        </p:txBody>
+      </p:sp>
+    </p:spTree>
+    <p:extLst>
+      <p:ext uri="{BB962C8B-B14F-4D97-AF65-F5344CB8AC3E}">
+        <p14:creationId xmlns:p14="http://schemas.microsoft.com/office/powerpoint/2010/main" val="289675507"/>
+      </p:ext>
+    </p:extLst>
+  </p:cSld>
+  <p:clrMapOvr>
+    <a:masterClrMapping/>
+  </p:clrMapOvr>
+</p:notes>
 </file>
 
 <file path=ppt/slideLayouts/slideLayout1.xml><?xml version="1.0" encoding="utf-8"?>
@@ -3984,6 +4358,2172 @@
 </p:sld>
 </file>
 
+<file path=ppt/slides/slide10.xml><?xml version="1.0" encoding="utf-8"?>
+<p:sld xmlns:a="http://schemas.openxmlformats.org/drawingml/2006/main" xmlns:r="http://schemas.openxmlformats.org/officeDocument/2006/relationships" xmlns:p="http://schemas.openxmlformats.org/presentationml/2006/main">
+  <p:cSld>
+    <p:spTree>
+      <p:nvGrpSpPr>
+        <p:cNvPr id="1" name=""/>
+        <p:cNvGrpSpPr/>
+        <p:nvPr/>
+      </p:nvGrpSpPr>
+      <p:grpSpPr>
+        <a:xfrm>
+          <a:off x="0" y="0"/>
+          <a:ext cx="0" cy="0"/>
+          <a:chOff x="0" y="0"/>
+          <a:chExt cx="0" cy="0"/>
+        </a:xfrm>
+      </p:grpSpPr>
+      <p:sp>
+        <p:nvSpPr>
+          <p:cNvPr id="2" name="Title 1"/>
+          <p:cNvSpPr>
+            <a:spLocks noGrp="1"/>
+          </p:cNvSpPr>
+          <p:nvPr>
+            <p:ph type="title"/>
+          </p:nvPr>
+        </p:nvSpPr>
+        <p:spPr/>
+        <p:txBody>
+          <a:bodyPr/>
+          <a:lstStyle/>
+          <a:p>
+            <a:pPr rtl="0"/>
+            <a:r>
+              <a:rPr lang="en-US" dirty="0" smtClean="0"/>
+              <a:t>Deterministic model</a:t>
+            </a:r>
+            <a:endParaRPr lang="he-IL" dirty="0"/>
+          </a:p>
+        </p:txBody>
+      </p:sp>
+      <mc:AlternateContent xmlns:mc="http://schemas.openxmlformats.org/markup-compatibility/2006">
+        <mc:Choice xmlns:a14="http://schemas.microsoft.com/office/drawing/2010/main" Requires="a14">
+          <p:sp>
+            <p:nvSpPr>
+              <p:cNvPr id="3" name="Content Placeholder 2"/>
+              <p:cNvSpPr>
+                <a:spLocks noGrp="1"/>
+              </p:cNvSpPr>
+              <p:nvPr>
+                <p:ph idx="1"/>
+              </p:nvPr>
+            </p:nvSpPr>
+            <p:spPr/>
+            <p:txBody>
+              <a:bodyPr>
+                <a:normAutofit/>
+              </a:bodyPr>
+              <a:lstStyle/>
+              <a:p>
+                <a:pPr marL="0" indent="0" algn="l" rtl="0">
+                  <a:buNone/>
+                </a:pPr>
+                <a:r>
+                  <a:rPr lang="en-US" sz="2800" dirty="0" smtClean="0">
+                    <a:solidFill>
+                      <a:schemeClr val="tx2"/>
+                    </a:solidFill>
+                  </a:rPr>
+                  <a:t>Constant environment, steady state</a:t>
+                </a:r>
+              </a:p>
+              <a:p>
+                <a:pPr marL="0" indent="0" algn="l" rtl="0">
+                  <a:buNone/>
+                </a:pPr>
+                <a:endParaRPr lang="en-US" sz="2800" dirty="0" smtClean="0"/>
+              </a:p>
+              <a:p>
+                <a:pPr marL="0" indent="0" algn="l" rtl="0">
+                  <a:buNone/>
+                </a:pPr>
+                <a14:m>
+                  <m:oMathPara xmlns:m="http://schemas.openxmlformats.org/officeDocument/2006/math">
+                    <m:oMathParaPr>
+                      <m:jc m:val="centerGroup"/>
+                    </m:oMathParaPr>
+                    <m:oMath xmlns:m="http://schemas.openxmlformats.org/officeDocument/2006/math">
+                      <m:r>
+                        <a:rPr lang="en-US" sz="2800" i="1">
+                          <a:latin typeface="Cambria Math"/>
+                        </a:rPr>
+                        <m:t>𝑠𝑖𝑔𝑛</m:t>
+                      </m:r>
+                      <m:f>
+                        <m:fPr>
+                          <m:ctrlPr>
+                            <a:rPr lang="en-US" sz="2800" i="1">
+                              <a:latin typeface="Cambria Math"/>
+                            </a:rPr>
+                          </m:ctrlPr>
+                        </m:fPr>
+                        <m:num>
+                          <m:r>
+                            <a:rPr lang="en-US" sz="2800" i="1">
+                              <a:latin typeface="Cambria Math"/>
+                              <a:ea typeface="Cambria Math"/>
+                            </a:rPr>
+                            <m:t>𝜕</m:t>
+                          </m:r>
+                          <m:acc>
+                            <m:accPr>
+                              <m:chr m:val="̅"/>
+                              <m:ctrlPr>
+                                <a:rPr lang="en-US" sz="2800" i="1">
+                                  <a:latin typeface="Cambria Math"/>
+                                </a:rPr>
+                              </m:ctrlPr>
+                            </m:accPr>
+                            <m:e>
+                              <m:r>
+                                <a:rPr lang="en-US" sz="2800" i="1">
+                                  <a:latin typeface="Cambria Math"/>
+                                </a:rPr>
+                                <m:t>𝜔</m:t>
+                              </m:r>
+                            </m:e>
+                          </m:acc>
+                        </m:num>
+                        <m:den>
+                          <m:r>
+                            <a:rPr lang="en-US" sz="2800" i="1">
+                              <a:latin typeface="Cambria Math"/>
+                              <a:ea typeface="Cambria Math"/>
+                            </a:rPr>
+                            <m:t>𝜕</m:t>
+                          </m:r>
+                          <m:sSub>
+                            <m:sSubPr>
+                              <m:ctrlPr>
+                                <a:rPr lang="en-US" sz="2800" i="1">
+                                  <a:latin typeface="Cambria Math"/>
+                                </a:rPr>
+                              </m:ctrlPr>
+                            </m:sSubPr>
+                            <m:e>
+                              <m:r>
+                                <a:rPr lang="en-US" sz="2800" i="1">
+                                  <a:latin typeface="Cambria Math"/>
+                                </a:rPr>
+                                <m:t>𝑚</m:t>
+                              </m:r>
+                            </m:e>
+                            <m:sub>
+                              <m:r>
+                                <a:rPr lang="en-US" sz="2800" i="1">
+                                  <a:latin typeface="Cambria Math"/>
+                                </a:rPr>
+                                <m:t>𝑥</m:t>
+                              </m:r>
+                            </m:sub>
+                          </m:sSub>
+                        </m:den>
+                      </m:f>
+                      <m:r>
+                        <a:rPr lang="en-US" sz="2800" i="1">
+                          <a:latin typeface="Cambria Math"/>
+                        </a:rPr>
+                        <m:t>=</m:t>
+                      </m:r>
+                      <m:r>
+                        <a:rPr lang="en-US" sz="2800" i="1">
+                          <a:latin typeface="Cambria Math"/>
+                        </a:rPr>
+                        <m:t>𝑠𝑖𝑔𝑛</m:t>
+                      </m:r>
+                      <m:r>
+                        <a:rPr lang="en-US" sz="2800" i="1" dirty="0">
+                          <a:latin typeface="Cambria Math"/>
+                        </a:rPr>
+                        <m:t> </m:t>
+                      </m:r>
+                      <m:d>
+                        <m:dPr>
+                          <m:ctrlPr>
+                            <a:rPr lang="en-US" sz="2800" i="1" dirty="0">
+                              <a:latin typeface="Cambria Math"/>
+                            </a:rPr>
+                          </m:ctrlPr>
+                        </m:dPr>
+                        <m:e>
+                          <m:acc>
+                            <m:accPr>
+                              <m:chr m:val="̅"/>
+                              <m:ctrlPr>
+                                <a:rPr lang="en-US" sz="2800" i="1">
+                                  <a:latin typeface="Cambria Math"/>
+                                </a:rPr>
+                              </m:ctrlPr>
+                            </m:accPr>
+                            <m:e>
+                              <m:r>
+                                <a:rPr lang="en-US" sz="2800" i="1">
+                                  <a:latin typeface="Cambria Math"/>
+                                </a:rPr>
+                                <m:t>𝜔</m:t>
+                              </m:r>
+                            </m:e>
+                          </m:acc>
+                          <m:r>
+                            <a:rPr lang="en-US" sz="2800">
+                              <a:latin typeface="Cambria Math"/>
+                            </a:rPr>
+                            <m:t>−</m:t>
+                          </m:r>
+                          <m:sSub>
+                            <m:sSubPr>
+                              <m:ctrlPr>
+                                <a:rPr lang="en-US" sz="2800" i="1">
+                                  <a:latin typeface="Cambria Math"/>
+                                </a:rPr>
+                              </m:ctrlPr>
+                            </m:sSubPr>
+                            <m:e>
+                              <m:r>
+                                <a:rPr lang="en-US" sz="2800" i="1">
+                                  <a:latin typeface="Cambria Math"/>
+                                </a:rPr>
+                                <m:t>𝜔</m:t>
+                              </m:r>
+                            </m:e>
+                            <m:sub>
+                              <m:r>
+                                <a:rPr lang="en-US" sz="2800" i="1">
+                                  <a:latin typeface="Cambria Math"/>
+                                </a:rPr>
+                                <m:t>𝑥</m:t>
+                              </m:r>
+                            </m:sub>
+                          </m:sSub>
+                        </m:e>
+                      </m:d>
+                    </m:oMath>
+                  </m:oMathPara>
+                </a14:m>
+                <a:endParaRPr lang="en-US" sz="2800" dirty="0" smtClean="0"/>
+              </a:p>
+              <a:p>
+                <a:pPr marL="0" indent="0" algn="l" rtl="0">
+                  <a:buNone/>
+                </a:pPr>
+                <a:endParaRPr lang="en-US" sz="2800" dirty="0"/>
+              </a:p>
+              <a:p>
+                <a:pPr marL="0" indent="0" algn="l" rtl="0">
+                  <a:buNone/>
+                </a:pPr>
+                <a:r>
+                  <a:rPr lang="en-US" sz="2800" b="1" dirty="0" smtClean="0"/>
+                  <a:t>Increasing </a:t>
+                </a:r>
+                <a:r>
+                  <a:rPr lang="en-US" sz="2800" b="1" dirty="0"/>
+                  <a:t>the mutation </a:t>
+                </a:r>
+                <a:r>
+                  <a:rPr lang="en-US" sz="2800" b="1" dirty="0" smtClean="0"/>
+                  <a:t>rate </a:t>
+                </a:r>
+                <a14:m>
+                  <m:oMath xmlns:m="http://schemas.openxmlformats.org/officeDocument/2006/math">
+                    <m:sSub>
+                      <m:sSubPr>
+                        <m:ctrlPr>
+                          <a:rPr lang="en-US" sz="2800" i="1">
+                            <a:latin typeface="Cambria Math"/>
+                          </a:rPr>
+                        </m:ctrlPr>
+                      </m:sSubPr>
+                      <m:e>
+                        <m:r>
+                          <a:rPr lang="en-US" sz="2800" i="1">
+                            <a:latin typeface="Cambria Math"/>
+                          </a:rPr>
+                          <m:t>𝑚</m:t>
+                        </m:r>
+                      </m:e>
+                      <m:sub>
+                        <m:r>
+                          <a:rPr lang="en-US" sz="2800" i="1">
+                            <a:latin typeface="Cambria Math"/>
+                          </a:rPr>
+                          <m:t>𝑥</m:t>
+                        </m:r>
+                      </m:sub>
+                    </m:sSub>
+                  </m:oMath>
+                </a14:m>
+                <a:r>
+                  <a:rPr lang="en-US" sz="2800" b="1" dirty="0" smtClean="0"/>
+                  <a:t> </a:t>
+                </a:r>
+                <a:r>
+                  <a:rPr lang="en-US" sz="2800" dirty="0"/>
+                  <a:t>of individuals with x harmful alleles </a:t>
+                </a:r>
+                <a:r>
+                  <a:rPr lang="en-US" sz="2800" b="1" dirty="0"/>
+                  <a:t>increases the population mean </a:t>
+                </a:r>
+                <a:r>
+                  <a:rPr lang="en-US" sz="2800" b="1" dirty="0" smtClean="0"/>
+                  <a:t>fitness </a:t>
+                </a:r>
+                <a14:m>
+                  <m:oMath xmlns:m="http://schemas.openxmlformats.org/officeDocument/2006/math">
+                    <m:acc>
+                      <m:accPr>
+                        <m:chr m:val="̅"/>
+                        <m:ctrlPr>
+                          <a:rPr lang="en-US" sz="2800" i="1">
+                            <a:latin typeface="Cambria Math"/>
+                          </a:rPr>
+                        </m:ctrlPr>
+                      </m:accPr>
+                      <m:e>
+                        <m:r>
+                          <a:rPr lang="en-US" sz="2800" i="1">
+                            <a:latin typeface="Cambria Math"/>
+                          </a:rPr>
+                          <m:t>𝜔</m:t>
+                        </m:r>
+                      </m:e>
+                    </m:acc>
+                  </m:oMath>
+                </a14:m>
+                <a:r>
+                  <a:rPr lang="en-US" sz="2800" dirty="0" smtClean="0"/>
+                  <a:t> </a:t>
+                </a:r>
+                <a:r>
+                  <a:rPr lang="en-US" sz="2800" dirty="0"/>
+                  <a:t>if and only </a:t>
+                </a:r>
+                <a:r>
+                  <a:rPr lang="en-US" sz="2800" b="1" dirty="0"/>
+                  <a:t>if</a:t>
+                </a:r>
+                <a:r>
+                  <a:rPr lang="en-US" sz="2800" dirty="0"/>
+                  <a:t> the </a:t>
+                </a:r>
+                <a:r>
+                  <a:rPr lang="en-US" sz="2800" b="1" dirty="0" smtClean="0"/>
+                  <a:t>fitness </a:t>
+                </a:r>
+                <a14:m>
+                  <m:oMath xmlns:m="http://schemas.openxmlformats.org/officeDocument/2006/math">
+                    <m:sSub>
+                      <m:sSubPr>
+                        <m:ctrlPr>
+                          <a:rPr lang="en-US" sz="2800" i="1">
+                            <a:latin typeface="Cambria Math"/>
+                          </a:rPr>
+                        </m:ctrlPr>
+                      </m:sSubPr>
+                      <m:e>
+                        <m:r>
+                          <a:rPr lang="en-US" sz="2800" i="1">
+                            <a:latin typeface="Cambria Math"/>
+                          </a:rPr>
+                          <m:t>𝜔</m:t>
+                        </m:r>
+                      </m:e>
+                      <m:sub>
+                        <m:r>
+                          <a:rPr lang="en-US" sz="2800" i="1">
+                            <a:latin typeface="Cambria Math"/>
+                          </a:rPr>
+                          <m:t>𝑥</m:t>
+                        </m:r>
+                      </m:sub>
+                    </m:sSub>
+                  </m:oMath>
+                </a14:m>
+                <a:r>
+                  <a:rPr lang="en-US" sz="2800" dirty="0" smtClean="0"/>
+                  <a:t> </a:t>
+                </a:r>
+                <a:r>
+                  <a:rPr lang="en-US" sz="2800" dirty="0"/>
+                  <a:t>with x harmful alleles </a:t>
+                </a:r>
+                <a:r>
+                  <a:rPr lang="en-US" sz="2800" b="1" dirty="0"/>
+                  <a:t>is lower than</a:t>
+                </a:r>
+                <a:r>
+                  <a:rPr lang="en-US" sz="2800" dirty="0"/>
+                  <a:t> the population </a:t>
+                </a:r>
+                <a:r>
+                  <a:rPr lang="en-US" sz="2800" b="1" dirty="0"/>
+                  <a:t>mean</a:t>
+                </a:r>
+                <a:r>
+                  <a:rPr lang="en-US" sz="2800" dirty="0"/>
+                  <a:t> </a:t>
+                </a:r>
+                <a:r>
+                  <a:rPr lang="en-US" sz="2800" dirty="0" smtClean="0"/>
+                  <a:t>fitness </a:t>
+                </a:r>
+                <a14:m>
+                  <m:oMath xmlns:m="http://schemas.openxmlformats.org/officeDocument/2006/math">
+                    <m:acc>
+                      <m:accPr>
+                        <m:chr m:val="̅"/>
+                        <m:ctrlPr>
+                          <a:rPr lang="en-US" sz="2800" i="1">
+                            <a:latin typeface="Cambria Math"/>
+                          </a:rPr>
+                        </m:ctrlPr>
+                      </m:accPr>
+                      <m:e>
+                        <m:r>
+                          <a:rPr lang="en-US" sz="2800" i="1">
+                            <a:latin typeface="Cambria Math"/>
+                          </a:rPr>
+                          <m:t>𝜔</m:t>
+                        </m:r>
+                      </m:e>
+                    </m:acc>
+                  </m:oMath>
+                </a14:m>
+                <a:endParaRPr lang="en-US" sz="2800" dirty="0"/>
+              </a:p>
+              <a:p>
+                <a:pPr marL="0" indent="0" algn="l" rtl="0">
+                  <a:buNone/>
+                </a:pPr>
+                <a:endParaRPr lang="en-US" sz="2800" dirty="0"/>
+              </a:p>
+            </p:txBody>
+          </p:sp>
+        </mc:Choice>
+        <mc:Fallback>
+          <p:sp>
+            <p:nvSpPr>
+              <p:cNvPr id="3" name="Content Placeholder 2"/>
+              <p:cNvSpPr>
+                <a:spLocks noGrp="1" noRot="1" noChangeAspect="1" noMove="1" noResize="1" noEditPoints="1" noAdjustHandles="1" noChangeArrowheads="1" noChangeShapeType="1" noTextEdit="1"/>
+              </p:cNvSpPr>
+              <p:nvPr>
+                <p:ph idx="1"/>
+              </p:nvPr>
+            </p:nvSpPr>
+            <p:spPr>
+              <a:blipFill rotWithShape="1">
+                <a:blip r:embed="rId2"/>
+                <a:stretch>
+                  <a:fillRect l="-1481" t="-1250" r="-1556"/>
+                </a:stretch>
+              </a:blipFill>
+            </p:spPr>
+            <p:txBody>
+              <a:bodyPr/>
+              <a:lstStyle/>
+              <a:p>
+                <a:r>
+                  <a:rPr lang="he-IL">
+                    <a:noFill/>
+                  </a:rPr>
+                  <a:t> </a:t>
+                </a:r>
+              </a:p>
+            </p:txBody>
+          </p:sp>
+        </mc:Fallback>
+      </mc:AlternateContent>
+      <p:sp>
+        <p:nvSpPr>
+          <p:cNvPr id="4" name="Date Placeholder 3"/>
+          <p:cNvSpPr>
+            <a:spLocks noGrp="1"/>
+          </p:cNvSpPr>
+          <p:nvPr>
+            <p:ph type="dt" sz="half" idx="10"/>
+          </p:nvPr>
+        </p:nvSpPr>
+        <p:spPr/>
+        <p:txBody>
+          <a:bodyPr/>
+          <a:lstStyle/>
+          <a:p>
+            <a:pPr rtl="0"/>
+            <a:r>
+              <a:rPr lang="he-IL" dirty="0" smtClean="0"/>
+              <a:t>SIDEER 2013</a:t>
+            </a:r>
+            <a:endParaRPr lang="he-IL" dirty="0"/>
+          </a:p>
+        </p:txBody>
+      </p:sp>
+      <p:sp>
+        <p:nvSpPr>
+          <p:cNvPr id="5" name="Footer Placeholder 4"/>
+          <p:cNvSpPr>
+            <a:spLocks noGrp="1"/>
+          </p:cNvSpPr>
+          <p:nvPr>
+            <p:ph type="ftr" sz="quarter" idx="11"/>
+          </p:nvPr>
+        </p:nvSpPr>
+        <p:spPr/>
+        <p:txBody>
+          <a:bodyPr/>
+          <a:lstStyle/>
+          <a:p>
+            <a:pPr algn="l"/>
+            <a:r>
+              <a:rPr lang="en-US" dirty="0" err="1" smtClean="0"/>
+              <a:t>Yoav</a:t>
+            </a:r>
+            <a:r>
+              <a:rPr lang="en-US" dirty="0" smtClean="0"/>
+              <a:t> Ram</a:t>
+            </a:r>
+            <a:endParaRPr lang="he-IL" dirty="0"/>
+          </a:p>
+        </p:txBody>
+      </p:sp>
+      <p:sp>
+        <p:nvSpPr>
+          <p:cNvPr id="6" name="Slide Number Placeholder 5"/>
+          <p:cNvSpPr>
+            <a:spLocks noGrp="1"/>
+          </p:cNvSpPr>
+          <p:nvPr>
+            <p:ph type="sldNum" sz="quarter" idx="12"/>
+          </p:nvPr>
+        </p:nvSpPr>
+        <p:spPr/>
+        <p:txBody>
+          <a:bodyPr/>
+          <a:lstStyle/>
+          <a:p>
+            <a:pPr algn="r"/>
+            <a:fld id="{DDDA39DD-F56F-4D5B-9830-607597A41E0F}" type="slidenum">
+              <a:rPr lang="he-IL" smtClean="0"/>
+              <a:pPr algn="r"/>
+              <a:t>10</a:t>
+            </a:fld>
+            <a:endParaRPr lang="he-IL" dirty="0"/>
+          </a:p>
+        </p:txBody>
+      </p:sp>
+    </p:spTree>
+    <p:extLst>
+      <p:ext uri="{BB962C8B-B14F-4D97-AF65-F5344CB8AC3E}">
+        <p14:creationId xmlns:p14="http://schemas.microsoft.com/office/powerpoint/2010/main" val="2522285303"/>
+      </p:ext>
+    </p:extLst>
+  </p:cSld>
+  <p:clrMapOvr>
+    <a:masterClrMapping/>
+  </p:clrMapOvr>
+  <p:timing>
+    <p:tnLst>
+      <p:par>
+        <p:cTn id="1" dur="indefinite" restart="never" nodeType="tmRoot"/>
+      </p:par>
+    </p:tnLst>
+  </p:timing>
+</p:sld>
+</file>
+
+<file path=ppt/slides/slide11.xml><?xml version="1.0" encoding="utf-8"?>
+<p:sld xmlns:a="http://schemas.openxmlformats.org/drawingml/2006/main" xmlns:r="http://schemas.openxmlformats.org/officeDocument/2006/relationships" xmlns:p="http://schemas.openxmlformats.org/presentationml/2006/main">
+  <p:cSld>
+    <p:spTree>
+      <p:nvGrpSpPr>
+        <p:cNvPr id="1" name=""/>
+        <p:cNvGrpSpPr/>
+        <p:nvPr/>
+      </p:nvGrpSpPr>
+      <p:grpSpPr>
+        <a:xfrm>
+          <a:off x="0" y="0"/>
+          <a:ext cx="0" cy="0"/>
+          <a:chOff x="0" y="0"/>
+          <a:chExt cx="0" cy="0"/>
+        </a:xfrm>
+      </p:grpSpPr>
+      <p:sp>
+        <p:nvSpPr>
+          <p:cNvPr id="3" name="Content Placeholder 2"/>
+          <p:cNvSpPr>
+            <a:spLocks noGrp="1"/>
+          </p:cNvSpPr>
+          <p:nvPr>
+            <p:ph idx="1"/>
+          </p:nvPr>
+        </p:nvSpPr>
+        <p:spPr>
+          <a:xfrm>
+            <a:off x="457200" y="5661248"/>
+            <a:ext cx="8229600" cy="720080"/>
+          </a:xfrm>
+        </p:spPr>
+        <p:txBody>
+          <a:bodyPr>
+            <a:normAutofit/>
+          </a:bodyPr>
+          <a:lstStyle/>
+          <a:p>
+            <a:pPr marL="0" indent="0" algn="l" rtl="0">
+              <a:buNone/>
+            </a:pPr>
+            <a:endParaRPr lang="en-US" i="1" dirty="0" smtClean="0">
+              <a:latin typeface="Cambria Math"/>
+            </a:endParaRPr>
+          </a:p>
+          <a:p>
+            <a:pPr marL="0" indent="0" algn="l" rtl="0">
+              <a:buNone/>
+            </a:pPr>
+            <a:endParaRPr lang="en-US" i="1" dirty="0">
+              <a:latin typeface="Cambria Math"/>
+            </a:endParaRPr>
+          </a:p>
+          <a:p>
+            <a:pPr marL="0" indent="0" algn="l" rtl="0">
+              <a:buNone/>
+            </a:pPr>
+            <a:endParaRPr lang="en-US" dirty="0" smtClean="0"/>
+          </a:p>
+        </p:txBody>
+      </p:sp>
+      <p:sp>
+        <p:nvSpPr>
+          <p:cNvPr id="6" name="Slide Number Placeholder 5"/>
+          <p:cNvSpPr>
+            <a:spLocks noGrp="1"/>
+          </p:cNvSpPr>
+          <p:nvPr>
+            <p:ph type="sldNum" sz="quarter" idx="12"/>
+          </p:nvPr>
+        </p:nvSpPr>
+        <p:spPr/>
+        <p:txBody>
+          <a:bodyPr/>
+          <a:lstStyle/>
+          <a:p>
+            <a:fld id="{22D68BCF-14A6-43A9-AA70-BAEC11B3F76D}" type="slidenum">
+              <a:rPr lang="en-US" smtClean="0"/>
+              <a:t>11</a:t>
+            </a:fld>
+            <a:endParaRPr lang="en-US"/>
+          </a:p>
+        </p:txBody>
+      </p:sp>
+      <p:sp>
+        <p:nvSpPr>
+          <p:cNvPr id="2" name="Date Placeholder 1"/>
+          <p:cNvSpPr>
+            <a:spLocks noGrp="1"/>
+          </p:cNvSpPr>
+          <p:nvPr>
+            <p:ph type="dt" sz="half" idx="10"/>
+          </p:nvPr>
+        </p:nvSpPr>
+        <p:spPr/>
+        <p:txBody>
+          <a:bodyPr/>
+          <a:lstStyle/>
+          <a:p>
+            <a:r>
+              <a:rPr lang="en-US" smtClean="0"/>
+              <a:t>23/9/2012</a:t>
+            </a:r>
+            <a:endParaRPr lang="en-US"/>
+          </a:p>
+        </p:txBody>
+      </p:sp>
+      <p:sp>
+        <p:nvSpPr>
+          <p:cNvPr id="7" name="Footer Placeholder 6"/>
+          <p:cNvSpPr>
+            <a:spLocks noGrp="1"/>
+          </p:cNvSpPr>
+          <p:nvPr>
+            <p:ph type="ftr" sz="quarter" idx="11"/>
+          </p:nvPr>
+        </p:nvSpPr>
+        <p:spPr/>
+        <p:txBody>
+          <a:bodyPr/>
+          <a:lstStyle/>
+          <a:p>
+            <a:r>
+              <a:rPr lang="en-US" smtClean="0"/>
+              <a:t>Yoav Ram</a:t>
+            </a:r>
+            <a:endParaRPr lang="en-US"/>
+          </a:p>
+        </p:txBody>
+      </p:sp>
+      <p:sp>
+        <p:nvSpPr>
+          <p:cNvPr id="5" name="Title 1"/>
+          <p:cNvSpPr>
+            <a:spLocks noGrp="1"/>
+          </p:cNvSpPr>
+          <p:nvPr>
+            <p:ph type="title"/>
+          </p:nvPr>
+        </p:nvSpPr>
+        <p:spPr>
+          <a:xfrm>
+            <a:off x="395536" y="274638"/>
+            <a:ext cx="4464496" cy="1143000"/>
+          </a:xfrm>
+        </p:spPr>
+        <p:txBody>
+          <a:bodyPr>
+            <a:normAutofit/>
+          </a:bodyPr>
+          <a:lstStyle/>
+          <a:p>
+            <a:pPr>
+              <a:spcBef>
+                <a:spcPts val="0"/>
+              </a:spcBef>
+            </a:pPr>
+            <a:r>
+              <a:rPr lang="en-US" dirty="0" smtClean="0"/>
+              <a:t>Results</a:t>
+            </a:r>
+            <a:endParaRPr lang="he-IL" sz="1800" dirty="0"/>
+          </a:p>
+        </p:txBody>
+      </p:sp>
+      <p:grpSp>
+        <p:nvGrpSpPr>
+          <p:cNvPr id="10" name="Group 9"/>
+          <p:cNvGrpSpPr/>
+          <p:nvPr/>
+        </p:nvGrpSpPr>
+        <p:grpSpPr>
+          <a:xfrm>
+            <a:off x="4803625" y="363434"/>
+            <a:ext cx="4232871" cy="6449942"/>
+            <a:chOff x="4860032" y="404664"/>
+            <a:chExt cx="4232871" cy="6449942"/>
+          </a:xfrm>
+        </p:grpSpPr>
+        <p:pic>
+          <p:nvPicPr>
+            <p:cNvPr id="12" name="Picture 3"/>
+            <p:cNvPicPr>
+              <a:picLocks noChangeAspect="1" noChangeArrowheads="1"/>
+            </p:cNvPicPr>
+            <p:nvPr/>
+          </p:nvPicPr>
+          <p:blipFill>
+            <a:blip r:embed="rId2">
+              <a:extLst>
+                <a:ext uri="{28A0092B-C50C-407E-A947-70E740481C1C}">
+                  <a14:useLocalDpi xmlns:a14="http://schemas.microsoft.com/office/drawing/2010/main" val="0"/>
+                </a:ext>
+              </a:extLst>
+            </a:blip>
+            <a:srcRect/>
+            <a:stretch>
+              <a:fillRect/>
+            </a:stretch>
+          </p:blipFill>
+          <p:spPr bwMode="auto">
+            <a:xfrm>
+              <a:off x="4860032" y="404664"/>
+              <a:ext cx="4217915" cy="3240000"/>
+            </a:xfrm>
+            <a:prstGeom prst="rect">
+              <a:avLst/>
+            </a:prstGeom>
+            <a:noFill/>
+            <a:ln>
+              <a:noFill/>
+            </a:ln>
+            <a:effectLst/>
+            <a:extLst>
+              <a:ext uri="{909E8E84-426E-40DD-AFC4-6F175D3DCCD1}">
+                <a14:hiddenFill xmlns:a14="http://schemas.microsoft.com/office/drawing/2010/main">
+                  <a:solidFill>
+                    <a:schemeClr val="accent1"/>
+                  </a:solidFill>
+                </a14:hiddenFill>
+              </a:ext>
+              <a:ext uri="{91240B29-F687-4F45-9708-019B960494DF}">
+                <a14:hiddenLine xmlns:a14="http://schemas.microsoft.com/office/drawing/2010/main" w="9525">
+                  <a:solidFill>
+                    <a:schemeClr val="tx1"/>
+                  </a:solidFill>
+                  <a:miter lim="800000"/>
+                  <a:headEnd/>
+                  <a:tailEnd/>
+                </a14:hiddenLine>
+              </a:ext>
+              <a:ext uri="{AF507438-7753-43E0-B8FC-AC1667EBCBE1}">
+                <a14:hiddenEffects xmlns:a14="http://schemas.microsoft.com/office/drawing/2010/main">
+                  <a:effectLst>
+                    <a:outerShdw dist="35921" dir="2700000" algn="ctr" rotWithShape="0">
+                      <a:schemeClr val="bg2"/>
+                    </a:outerShdw>
+                  </a:effectLst>
+                </a14:hiddenEffects>
+              </a:ext>
+            </a:extLst>
+          </p:spPr>
+        </p:pic>
+        <p:pic>
+          <p:nvPicPr>
+            <p:cNvPr id="1028" name="Picture 4"/>
+            <p:cNvPicPr>
+              <a:picLocks noChangeAspect="1" noChangeArrowheads="1"/>
+            </p:cNvPicPr>
+            <p:nvPr/>
+          </p:nvPicPr>
+          <p:blipFill>
+            <a:blip r:embed="rId3">
+              <a:extLst>
+                <a:ext uri="{28A0092B-C50C-407E-A947-70E740481C1C}">
+                  <a14:useLocalDpi xmlns:a14="http://schemas.microsoft.com/office/drawing/2010/main" val="0"/>
+                </a:ext>
+              </a:extLst>
+            </a:blip>
+            <a:srcRect/>
+            <a:stretch>
+              <a:fillRect/>
+            </a:stretch>
+          </p:blipFill>
+          <p:spPr bwMode="auto">
+            <a:xfrm>
+              <a:off x="4860032" y="3398638"/>
+              <a:ext cx="4232871" cy="3240000"/>
+            </a:xfrm>
+            <a:prstGeom prst="rect">
+              <a:avLst/>
+            </a:prstGeom>
+            <a:noFill/>
+            <a:ln>
+              <a:noFill/>
+            </a:ln>
+            <a:effectLst/>
+            <a:extLst>
+              <a:ext uri="{909E8E84-426E-40DD-AFC4-6F175D3DCCD1}">
+                <a14:hiddenFill xmlns:a14="http://schemas.microsoft.com/office/drawing/2010/main">
+                  <a:solidFill>
+                    <a:schemeClr val="accent1"/>
+                  </a:solidFill>
+                </a14:hiddenFill>
+              </a:ext>
+              <a:ext uri="{91240B29-F687-4F45-9708-019B960494DF}">
+                <a14:hiddenLine xmlns:a14="http://schemas.microsoft.com/office/drawing/2010/main" w="9525">
+                  <a:solidFill>
+                    <a:schemeClr val="tx1"/>
+                  </a:solidFill>
+                  <a:miter lim="800000"/>
+                  <a:headEnd/>
+                  <a:tailEnd/>
+                </a14:hiddenLine>
+              </a:ext>
+              <a:ext uri="{AF507438-7753-43E0-B8FC-AC1667EBCBE1}">
+                <a14:hiddenEffects xmlns:a14="http://schemas.microsoft.com/office/drawing/2010/main">
+                  <a:effectLst>
+                    <a:outerShdw dist="35921" dir="2700000" algn="ctr" rotWithShape="0">
+                      <a:schemeClr val="bg2"/>
+                    </a:outerShdw>
+                  </a:effectLst>
+                </a14:hiddenEffects>
+              </a:ext>
+            </a:extLst>
+          </p:spPr>
+        </p:pic>
+        <p:sp>
+          <p:nvSpPr>
+            <p:cNvPr id="11" name="TextBox 10"/>
+            <p:cNvSpPr txBox="1"/>
+            <p:nvPr/>
+          </p:nvSpPr>
+          <p:spPr>
+            <a:xfrm>
+              <a:off x="5292080" y="6485274"/>
+              <a:ext cx="3744416" cy="369332"/>
+            </a:xfrm>
+            <a:prstGeom prst="rect">
+              <a:avLst/>
+            </a:prstGeom>
+            <a:solidFill>
+              <a:schemeClr val="bg1"/>
+            </a:solidFill>
+          </p:spPr>
+          <p:txBody>
+            <a:bodyPr wrap="square" rtlCol="1">
+              <a:spAutoFit/>
+            </a:bodyPr>
+            <a:lstStyle/>
+            <a:p>
+              <a:pPr algn="ctr"/>
+              <a:r>
+                <a:rPr lang="en-US" b="1" dirty="0" smtClean="0"/>
+                <a:t>Mutation Rate Increase</a:t>
+              </a:r>
+              <a:endParaRPr lang="he-IL" b="1" dirty="0"/>
+            </a:p>
+          </p:txBody>
+        </p:sp>
+        <p:sp>
+          <p:nvSpPr>
+            <p:cNvPr id="9" name="TextBox 8"/>
+            <p:cNvSpPr txBox="1"/>
+            <p:nvPr/>
+          </p:nvSpPr>
+          <p:spPr>
+            <a:xfrm>
+              <a:off x="6428607" y="508610"/>
+              <a:ext cx="1512168" cy="369332"/>
+            </a:xfrm>
+            <a:prstGeom prst="rect">
+              <a:avLst/>
+            </a:prstGeom>
+            <a:noFill/>
+          </p:spPr>
+          <p:txBody>
+            <a:bodyPr wrap="square" rtlCol="1">
+              <a:spAutoFit/>
+            </a:bodyPr>
+            <a:lstStyle/>
+            <a:p>
+              <a:pPr algn="ctr"/>
+              <a:r>
+                <a:rPr lang="en-US" b="1" dirty="0" smtClean="0">
+                  <a:ea typeface="+mj-ea"/>
+                  <a:cs typeface="+mj-cs"/>
+                </a:rPr>
+                <a:t>SIM vs. NM</a:t>
+              </a:r>
+              <a:endParaRPr lang="he-IL" b="1" dirty="0">
+                <a:ea typeface="+mj-ea"/>
+                <a:cs typeface="+mj-cs"/>
+              </a:endParaRPr>
+            </a:p>
+          </p:txBody>
+        </p:sp>
+        <p:sp>
+          <p:nvSpPr>
+            <p:cNvPr id="13" name="TextBox 12"/>
+            <p:cNvSpPr txBox="1"/>
+            <p:nvPr/>
+          </p:nvSpPr>
+          <p:spPr>
+            <a:xfrm>
+              <a:off x="6444208" y="3532946"/>
+              <a:ext cx="1512168" cy="369332"/>
+            </a:xfrm>
+            <a:prstGeom prst="rect">
+              <a:avLst/>
+            </a:prstGeom>
+            <a:noFill/>
+          </p:spPr>
+          <p:txBody>
+            <a:bodyPr wrap="square" rtlCol="1">
+              <a:spAutoFit/>
+            </a:bodyPr>
+            <a:lstStyle/>
+            <a:p>
+              <a:pPr algn="ctr"/>
+              <a:r>
+                <a:rPr lang="en-US" b="1" dirty="0" smtClean="0">
+                  <a:ea typeface="+mj-ea"/>
+                  <a:cs typeface="+mj-cs"/>
+                </a:rPr>
+                <a:t>CM vs. NM</a:t>
+              </a:r>
+              <a:endParaRPr lang="he-IL" b="1" dirty="0">
+                <a:ea typeface="+mj-ea"/>
+                <a:cs typeface="+mj-cs"/>
+              </a:endParaRPr>
+            </a:p>
+          </p:txBody>
+        </p:sp>
+      </p:grpSp>
+      <p:sp>
+        <p:nvSpPr>
+          <p:cNvPr id="14" name="Content Placeholder 4"/>
+          <p:cNvSpPr txBox="1">
+            <a:spLocks/>
+          </p:cNvSpPr>
+          <p:nvPr/>
+        </p:nvSpPr>
+        <p:spPr>
+          <a:xfrm>
+            <a:off x="251520" y="1340768"/>
+            <a:ext cx="4167171" cy="4928482"/>
+          </a:xfrm>
+          <a:prstGeom prst="rect">
+            <a:avLst/>
+          </a:prstGeom>
+        </p:spPr>
+        <p:txBody>
+          <a:bodyPr vert="horz" lIns="91440" tIns="45720" rIns="91440" bIns="45720" rtlCol="0">
+            <a:noAutofit/>
+          </a:bodyPr>
+          <a:lstStyle>
+            <a:lvl1pPr marL="342900" indent="-342900" algn="l" defTabSz="914400" rtl="0" eaLnBrk="1" latinLnBrk="0" hangingPunct="1">
+              <a:spcBef>
+                <a:spcPct val="20000"/>
+              </a:spcBef>
+              <a:buFont typeface="Arial" pitchFamily="34" charset="0"/>
+              <a:buChar char="•"/>
+              <a:defRPr sz="3200" kern="1200">
+                <a:solidFill>
+                  <a:schemeClr val="tx1"/>
+                </a:solidFill>
+                <a:latin typeface="+mn-lt"/>
+                <a:ea typeface="+mn-ea"/>
+                <a:cs typeface="+mn-cs"/>
+              </a:defRPr>
+            </a:lvl1pPr>
+            <a:lvl2pPr marL="742950" indent="-285750" algn="l" defTabSz="914400" rtl="0" eaLnBrk="1" latinLnBrk="0" hangingPunct="1">
+              <a:spcBef>
+                <a:spcPct val="20000"/>
+              </a:spcBef>
+              <a:buFont typeface="Arial" pitchFamily="34" charset="0"/>
+              <a:buChar char="–"/>
+              <a:defRPr sz="2800" kern="1200">
+                <a:solidFill>
+                  <a:schemeClr val="tx1"/>
+                </a:solidFill>
+                <a:latin typeface="+mn-lt"/>
+                <a:ea typeface="+mn-ea"/>
+                <a:cs typeface="+mn-cs"/>
+              </a:defRPr>
+            </a:lvl2pPr>
+            <a:lvl3pPr marL="1143000" indent="-228600" algn="l" defTabSz="914400" rtl="0" eaLnBrk="1" latinLnBrk="0" hangingPunct="1">
+              <a:spcBef>
+                <a:spcPct val="20000"/>
+              </a:spcBef>
+              <a:buFont typeface="Arial" pitchFamily="34" charset="0"/>
+              <a:buChar char="•"/>
+              <a:defRPr sz="2400" kern="1200">
+                <a:solidFill>
+                  <a:schemeClr val="tx1"/>
+                </a:solidFill>
+                <a:latin typeface="+mn-lt"/>
+                <a:ea typeface="+mn-ea"/>
+                <a:cs typeface="+mn-cs"/>
+              </a:defRPr>
+            </a:lvl3pPr>
+            <a:lvl4pPr marL="1600200" indent="-228600" algn="l" defTabSz="914400" rtl="0" eaLnBrk="1" latinLnBrk="0" hangingPunct="1">
+              <a:spcBef>
+                <a:spcPct val="20000"/>
+              </a:spcBef>
+              <a:buFont typeface="Arial" pitchFamily="34" charset="0"/>
+              <a:buChar char="–"/>
+              <a:defRPr sz="2000" kern="1200">
+                <a:solidFill>
+                  <a:schemeClr val="tx1"/>
+                </a:solidFill>
+                <a:latin typeface="+mn-lt"/>
+                <a:ea typeface="+mn-ea"/>
+                <a:cs typeface="+mn-cs"/>
+              </a:defRPr>
+            </a:lvl4pPr>
+            <a:lvl5pPr marL="2057400" indent="-228600" algn="l" defTabSz="914400" rtl="0" eaLnBrk="1" latinLnBrk="0" hangingPunct="1">
+              <a:spcBef>
+                <a:spcPct val="20000"/>
+              </a:spcBef>
+              <a:buFont typeface="Arial" pitchFamily="34" charset="0"/>
+              <a:buChar char="»"/>
+              <a:defRPr sz="2000" kern="1200">
+                <a:solidFill>
+                  <a:schemeClr val="tx1"/>
+                </a:solidFill>
+                <a:latin typeface="+mn-lt"/>
+                <a:ea typeface="+mn-ea"/>
+                <a:cs typeface="+mn-cs"/>
+              </a:defRPr>
+            </a:lvl5pPr>
+            <a:lvl6pPr marL="2514600" indent="-228600" algn="l" defTabSz="914400" rtl="0" eaLnBrk="1" latinLnBrk="0" hangingPunct="1">
+              <a:spcBef>
+                <a:spcPct val="20000"/>
+              </a:spcBef>
+              <a:buFont typeface="Arial" pitchFamily="34" charset="0"/>
+              <a:buChar char="•"/>
+              <a:defRPr sz="2000" kern="1200">
+                <a:solidFill>
+                  <a:schemeClr val="tx1"/>
+                </a:solidFill>
+                <a:latin typeface="+mn-lt"/>
+                <a:ea typeface="+mn-ea"/>
+                <a:cs typeface="+mn-cs"/>
+              </a:defRPr>
+            </a:lvl6pPr>
+            <a:lvl7pPr marL="2971800" indent="-228600" algn="l" defTabSz="914400" rtl="0" eaLnBrk="1" latinLnBrk="0" hangingPunct="1">
+              <a:spcBef>
+                <a:spcPct val="20000"/>
+              </a:spcBef>
+              <a:buFont typeface="Arial" pitchFamily="34" charset="0"/>
+              <a:buChar char="•"/>
+              <a:defRPr sz="2000" kern="1200">
+                <a:solidFill>
+                  <a:schemeClr val="tx1"/>
+                </a:solidFill>
+                <a:latin typeface="+mn-lt"/>
+                <a:ea typeface="+mn-ea"/>
+                <a:cs typeface="+mn-cs"/>
+              </a:defRPr>
+            </a:lvl7pPr>
+            <a:lvl8pPr marL="3429000" indent="-228600" algn="l" defTabSz="914400" rtl="0" eaLnBrk="1" latinLnBrk="0" hangingPunct="1">
+              <a:spcBef>
+                <a:spcPct val="20000"/>
+              </a:spcBef>
+              <a:buFont typeface="Arial" pitchFamily="34" charset="0"/>
+              <a:buChar char="•"/>
+              <a:defRPr sz="2000" kern="1200">
+                <a:solidFill>
+                  <a:schemeClr val="tx1"/>
+                </a:solidFill>
+                <a:latin typeface="+mn-lt"/>
+                <a:ea typeface="+mn-ea"/>
+                <a:cs typeface="+mn-cs"/>
+              </a:defRPr>
+            </a:lvl8pPr>
+            <a:lvl9pPr marL="3886200" indent="-228600" algn="l" defTabSz="914400" rtl="0" eaLnBrk="1" latinLnBrk="0" hangingPunct="1">
+              <a:spcBef>
+                <a:spcPct val="20000"/>
+              </a:spcBef>
+              <a:buFont typeface="Arial" pitchFamily="34" charset="0"/>
+              <a:buChar char="•"/>
+              <a:defRPr sz="2000" kern="1200">
+                <a:solidFill>
+                  <a:schemeClr val="tx1"/>
+                </a:solidFill>
+                <a:latin typeface="+mn-lt"/>
+                <a:ea typeface="+mn-ea"/>
+                <a:cs typeface="+mn-cs"/>
+              </a:defRPr>
+            </a:lvl9pPr>
+          </a:lstStyle>
+          <a:p>
+            <a:r>
+              <a:rPr lang="en-US" sz="2400" b="1" dirty="0" smtClean="0"/>
+              <a:t>NM</a:t>
+            </a:r>
+            <a:r>
+              <a:rPr lang="en-US" sz="2400" b="1" dirty="0"/>
+              <a:t> </a:t>
+            </a:r>
+            <a:r>
+              <a:rPr lang="en-US" sz="2400" b="1" dirty="0" smtClean="0"/>
+              <a:t>- Non-mutators </a:t>
+            </a:r>
+          </a:p>
+          <a:p>
+            <a:pPr lvl="1"/>
+            <a:r>
+              <a:rPr lang="en-US" sz="2400" dirty="0" smtClean="0"/>
+              <a:t>constant </a:t>
+            </a:r>
+            <a:r>
+              <a:rPr lang="en-US" sz="2400" u="sng" dirty="0" smtClean="0"/>
+              <a:t>low</a:t>
+            </a:r>
+            <a:r>
+              <a:rPr lang="en-US" sz="2400" dirty="0" smtClean="0"/>
+              <a:t> rate of mutation</a:t>
+            </a:r>
+          </a:p>
+          <a:p>
+            <a:r>
+              <a:rPr lang="en-US" sz="2400" b="1" dirty="0" smtClean="0"/>
+              <a:t>CM - Constitutive mutators</a:t>
+            </a:r>
+          </a:p>
+          <a:p>
+            <a:pPr lvl="1"/>
+            <a:r>
+              <a:rPr lang="en-US" sz="2400" dirty="0" smtClean="0"/>
+              <a:t>Constant </a:t>
+            </a:r>
+            <a:r>
+              <a:rPr lang="en-US" sz="2400" u="sng" dirty="0" smtClean="0"/>
+              <a:t>high</a:t>
+            </a:r>
+            <a:r>
+              <a:rPr lang="en-US" sz="2400" dirty="0" smtClean="0"/>
+              <a:t> rate of mutation</a:t>
+            </a:r>
+          </a:p>
+          <a:p>
+            <a:r>
+              <a:rPr lang="en-US" sz="2400" b="1" dirty="0" smtClean="0"/>
+              <a:t>SIM - Stress-induced mutators</a:t>
+            </a:r>
+          </a:p>
+          <a:p>
+            <a:pPr lvl="1"/>
+            <a:r>
+              <a:rPr lang="en-US" sz="2400" u="sng" dirty="0" smtClean="0"/>
+              <a:t>Low</a:t>
+            </a:r>
+            <a:r>
+              <a:rPr lang="en-US" sz="2400" dirty="0" smtClean="0"/>
+              <a:t> mutation rate when </a:t>
+            </a:r>
+            <a:r>
+              <a:rPr lang="en-US" sz="2400" u="sng" dirty="0" smtClean="0"/>
+              <a:t>well-adapted</a:t>
+            </a:r>
+          </a:p>
+          <a:p>
+            <a:pPr lvl="1"/>
+            <a:r>
+              <a:rPr lang="en-US" sz="2400" u="sng" dirty="0" smtClean="0"/>
+              <a:t>High</a:t>
+            </a:r>
+            <a:r>
+              <a:rPr lang="en-US" sz="2400" dirty="0" smtClean="0"/>
+              <a:t> mutation rate when </a:t>
+            </a:r>
+            <a:r>
+              <a:rPr lang="en-US" sz="2400" u="sng" dirty="0" smtClean="0"/>
+              <a:t>stressed</a:t>
+            </a:r>
+          </a:p>
+        </p:txBody>
+      </p:sp>
+      <p:sp>
+        <p:nvSpPr>
+          <p:cNvPr id="16" name="Rectangle 15"/>
+          <p:cNvSpPr/>
+          <p:nvPr/>
+        </p:nvSpPr>
+        <p:spPr>
+          <a:xfrm rot="16200000">
+            <a:off x="1875037" y="3180309"/>
+            <a:ext cx="5456641" cy="369332"/>
+          </a:xfrm>
+          <a:prstGeom prst="rect">
+            <a:avLst/>
+          </a:prstGeom>
+          <a:solidFill>
+            <a:schemeClr val="bg1"/>
+          </a:solidFill>
+        </p:spPr>
+        <p:txBody>
+          <a:bodyPr wrap="square">
+            <a:spAutoFit/>
+          </a:bodyPr>
+          <a:lstStyle/>
+          <a:p>
+            <a:pPr algn="ctr"/>
+            <a:r>
+              <a:rPr lang="en-US" b="1" dirty="0"/>
+              <a:t>Relative Fitness Advantage</a:t>
+            </a:r>
+            <a:endParaRPr lang="he-IL" b="1" dirty="0"/>
+          </a:p>
+        </p:txBody>
+      </p:sp>
+      <p:sp>
+        <p:nvSpPr>
+          <p:cNvPr id="17" name="Rectangle 16"/>
+          <p:cNvSpPr/>
+          <p:nvPr/>
+        </p:nvSpPr>
+        <p:spPr>
+          <a:xfrm>
+            <a:off x="4788024" y="1556792"/>
+            <a:ext cx="144016" cy="360040"/>
+          </a:xfrm>
+          <a:prstGeom prst="rect">
+            <a:avLst/>
+          </a:prstGeom>
+          <a:solidFill>
+            <a:schemeClr val="bg1"/>
+          </a:solidFill>
+          <a:ln>
+            <a:noFill/>
+          </a:ln>
+        </p:spPr>
+        <p:style>
+          <a:lnRef idx="2">
+            <a:schemeClr val="accent1">
+              <a:shade val="50000"/>
+            </a:schemeClr>
+          </a:lnRef>
+          <a:fillRef idx="1">
+            <a:schemeClr val="accent1"/>
+          </a:fillRef>
+          <a:effectRef idx="0">
+            <a:schemeClr val="accent1"/>
+          </a:effectRef>
+          <a:fontRef idx="minor">
+            <a:schemeClr val="lt1"/>
+          </a:fontRef>
+        </p:style>
+        <p:txBody>
+          <a:bodyPr rtlCol="1" anchor="ctr"/>
+          <a:lstStyle/>
+          <a:p>
+            <a:pPr algn="ctr"/>
+            <a:endParaRPr lang="he-IL"/>
+          </a:p>
+        </p:txBody>
+      </p:sp>
+      <p:sp>
+        <p:nvSpPr>
+          <p:cNvPr id="19" name="Rectangle 18"/>
+          <p:cNvSpPr/>
+          <p:nvPr/>
+        </p:nvSpPr>
+        <p:spPr>
+          <a:xfrm>
+            <a:off x="4796408" y="4581128"/>
+            <a:ext cx="144016" cy="360040"/>
+          </a:xfrm>
+          <a:prstGeom prst="rect">
+            <a:avLst/>
+          </a:prstGeom>
+          <a:solidFill>
+            <a:schemeClr val="bg1"/>
+          </a:solidFill>
+          <a:ln>
+            <a:noFill/>
+          </a:ln>
+        </p:spPr>
+        <p:style>
+          <a:lnRef idx="2">
+            <a:schemeClr val="accent1">
+              <a:shade val="50000"/>
+            </a:schemeClr>
+          </a:lnRef>
+          <a:fillRef idx="1">
+            <a:schemeClr val="accent1"/>
+          </a:fillRef>
+          <a:effectRef idx="0">
+            <a:schemeClr val="accent1"/>
+          </a:effectRef>
+          <a:fontRef idx="minor">
+            <a:schemeClr val="lt1"/>
+          </a:fontRef>
+        </p:style>
+        <p:txBody>
+          <a:bodyPr rtlCol="1" anchor="ctr"/>
+          <a:lstStyle/>
+          <a:p>
+            <a:pPr algn="ctr"/>
+            <a:endParaRPr lang="he-IL"/>
+          </a:p>
+        </p:txBody>
+      </p:sp>
+      <p:sp>
+        <p:nvSpPr>
+          <p:cNvPr id="4" name="Rectangle 3"/>
+          <p:cNvSpPr/>
+          <p:nvPr/>
+        </p:nvSpPr>
+        <p:spPr>
+          <a:xfrm>
+            <a:off x="8388424" y="2827675"/>
+            <a:ext cx="375641" cy="169277"/>
+          </a:xfrm>
+          <a:prstGeom prst="rect">
+            <a:avLst/>
+          </a:prstGeom>
+          <a:solidFill>
+            <a:schemeClr val="bg1"/>
+          </a:solidFill>
+          <a:ln>
+            <a:noFill/>
+          </a:ln>
+        </p:spPr>
+        <p:style>
+          <a:lnRef idx="2">
+            <a:schemeClr val="accent1">
+              <a:shade val="50000"/>
+            </a:schemeClr>
+          </a:lnRef>
+          <a:fillRef idx="1">
+            <a:schemeClr val="accent1"/>
+          </a:fillRef>
+          <a:effectRef idx="0">
+            <a:schemeClr val="accent1"/>
+          </a:effectRef>
+          <a:fontRef idx="minor">
+            <a:schemeClr val="lt1"/>
+          </a:fontRef>
+        </p:style>
+        <p:txBody>
+          <a:bodyPr rtlCol="1" anchor="ctr"/>
+          <a:lstStyle/>
+          <a:p>
+            <a:pPr algn="ctr"/>
+            <a:endParaRPr lang="he-IL"/>
+          </a:p>
+        </p:txBody>
+      </p:sp>
+      <p:sp>
+        <p:nvSpPr>
+          <p:cNvPr id="18" name="TextBox 17"/>
+          <p:cNvSpPr txBox="1"/>
+          <p:nvPr/>
+        </p:nvSpPr>
+        <p:spPr>
+          <a:xfrm>
+            <a:off x="6732240" y="2924944"/>
+            <a:ext cx="2376264" cy="307777"/>
+          </a:xfrm>
+          <a:prstGeom prst="rect">
+            <a:avLst/>
+          </a:prstGeom>
+          <a:noFill/>
+        </p:spPr>
+        <p:txBody>
+          <a:bodyPr wrap="square" rtlCol="1">
+            <a:spAutoFit/>
+          </a:bodyPr>
+          <a:lstStyle/>
+          <a:p>
+            <a:pPr algn="ctr"/>
+            <a:r>
+              <a:rPr lang="en-US" sz="1400" b="1" dirty="0" smtClean="0"/>
+              <a:t>No Beneficial Mutations</a:t>
+            </a:r>
+            <a:endParaRPr lang="he-IL" sz="1400" b="1" dirty="0"/>
+          </a:p>
+        </p:txBody>
+      </p:sp>
+    </p:spTree>
+    <p:extLst>
+      <p:ext uri="{BB962C8B-B14F-4D97-AF65-F5344CB8AC3E}">
+        <p14:creationId xmlns:p14="http://schemas.microsoft.com/office/powerpoint/2010/main" val="1705875779"/>
+      </p:ext>
+    </p:extLst>
+  </p:cSld>
+  <p:clrMapOvr>
+    <a:masterClrMapping/>
+  </p:clrMapOvr>
+  <mc:AlternateContent xmlns:mc="http://schemas.openxmlformats.org/markup-compatibility/2006" xmlns:p14="http://schemas.microsoft.com/office/powerpoint/2010/main">
+    <mc:Choice Requires="p14">
+      <p:transition spd="slow" p14:dur="2000" advTm="88619"/>
+    </mc:Choice>
+    <mc:Fallback xmlns="">
+      <p:transition spd="slow" advTm="88619"/>
+    </mc:Fallback>
+  </mc:AlternateContent>
+  <p:timing>
+    <p:tnLst>
+      <p:par>
+        <p:cTn id="1" dur="indefinite" restart="never" nodeType="tmRoot"/>
+      </p:par>
+    </p:tnLst>
+  </p:timing>
+</p:sld>
+</file>
+
+<file path=ppt/slides/slide12.xml><?xml version="1.0" encoding="utf-8"?>
+<p:sld xmlns:a="http://schemas.openxmlformats.org/drawingml/2006/main" xmlns:r="http://schemas.openxmlformats.org/officeDocument/2006/relationships" xmlns:p="http://schemas.openxmlformats.org/presentationml/2006/main">
+  <p:cSld>
+    <p:spTree>
+      <p:nvGrpSpPr>
+        <p:cNvPr id="1" name=""/>
+        <p:cNvGrpSpPr/>
+        <p:nvPr/>
+      </p:nvGrpSpPr>
+      <p:grpSpPr>
+        <a:xfrm>
+          <a:off x="0" y="0"/>
+          <a:ext cx="0" cy="0"/>
+          <a:chOff x="0" y="0"/>
+          <a:chExt cx="0" cy="0"/>
+        </a:xfrm>
+      </p:grpSpPr>
+      <p:pic>
+        <p:nvPicPr>
+          <p:cNvPr id="7" name="Picture 2"/>
+          <p:cNvPicPr>
+            <a:picLocks noChangeAspect="1" noChangeArrowheads="1"/>
+          </p:cNvPicPr>
+          <p:nvPr/>
+        </p:nvPicPr>
+        <p:blipFill rotWithShape="1">
+          <a:blip r:embed="rId3" cstate="print">
+            <a:extLst>
+              <a:ext uri="{28A0092B-C50C-407E-A947-70E740481C1C}">
+                <a14:useLocalDpi xmlns:a14="http://schemas.microsoft.com/office/drawing/2010/main" val="0"/>
+              </a:ext>
+            </a:extLst>
+          </a:blip>
+          <a:srcRect l="7780" t="7010" r="9127" b="1839"/>
+          <a:stretch/>
+        </p:blipFill>
+        <p:spPr bwMode="auto">
+          <a:xfrm>
+            <a:off x="1547664" y="2060848"/>
+            <a:ext cx="6182880" cy="4797152"/>
+          </a:xfrm>
+          <a:prstGeom prst="rect">
+            <a:avLst/>
+          </a:prstGeom>
+          <a:noFill/>
+          <a:ln>
+            <a:noFill/>
+          </a:ln>
+          <a:effectLst/>
+          <a:extLst>
+            <a:ext uri="{909E8E84-426E-40DD-AFC4-6F175D3DCCD1}">
+              <a14:hiddenFill xmlns:a14="http://schemas.microsoft.com/office/drawing/2010/main">
+                <a:solidFill>
+                  <a:schemeClr val="accent1"/>
+                </a:solidFill>
+              </a14:hiddenFill>
+            </a:ext>
+            <a:ext uri="{91240B29-F687-4F45-9708-019B960494DF}">
+              <a14:hiddenLine xmlns:a14="http://schemas.microsoft.com/office/drawing/2010/main" w="9525">
+                <a:solidFill>
+                  <a:schemeClr val="tx1"/>
+                </a:solidFill>
+                <a:miter lim="800000"/>
+                <a:headEnd/>
+                <a:tailEnd/>
+              </a14:hiddenLine>
+            </a:ext>
+            <a:ext uri="{AF507438-7753-43E0-B8FC-AC1667EBCBE1}">
+              <a14:hiddenEffects xmlns:a14="http://schemas.microsoft.com/office/drawing/2010/main">
+                <a:effectLst>
+                  <a:outerShdw dist="35921" dir="2700000" algn="ctr" rotWithShape="0">
+                    <a:schemeClr val="bg2"/>
+                  </a:outerShdw>
+                </a:effectLst>
+              </a14:hiddenEffects>
+            </a:ext>
+          </a:extLst>
+        </p:spPr>
+      </p:pic>
+      <p:sp>
+        <p:nvSpPr>
+          <p:cNvPr id="2" name="Title 1"/>
+          <p:cNvSpPr>
+            <a:spLocks noGrp="1"/>
+          </p:cNvSpPr>
+          <p:nvPr>
+            <p:ph type="title"/>
+          </p:nvPr>
+        </p:nvSpPr>
+        <p:spPr/>
+        <p:txBody>
+          <a:bodyPr/>
+          <a:lstStyle/>
+          <a:p>
+            <a:pPr rtl="0"/>
+            <a:r>
+              <a:rPr lang="en-US" dirty="0" smtClean="0"/>
+              <a:t>Stochastic model</a:t>
+            </a:r>
+            <a:endParaRPr lang="he-IL" dirty="0"/>
+          </a:p>
+        </p:txBody>
+      </p:sp>
+      <p:sp>
+        <p:nvSpPr>
+          <p:cNvPr id="3" name="Content Placeholder 2"/>
+          <p:cNvSpPr>
+            <a:spLocks noGrp="1"/>
+          </p:cNvSpPr>
+          <p:nvPr>
+            <p:ph idx="1"/>
+          </p:nvPr>
+        </p:nvSpPr>
+        <p:spPr/>
+        <p:txBody>
+          <a:bodyPr>
+            <a:normAutofit/>
+          </a:bodyPr>
+          <a:lstStyle/>
+          <a:p>
+            <a:pPr marL="0" indent="0" algn="l" rtl="0">
+              <a:buNone/>
+            </a:pPr>
+            <a:r>
+              <a:rPr lang="en-US" sz="2800" dirty="0" smtClean="0">
+                <a:solidFill>
+                  <a:schemeClr val="tx2"/>
+                </a:solidFill>
+              </a:rPr>
+              <a:t>Changing environment, competitions</a:t>
+            </a:r>
+          </a:p>
+          <a:p>
+            <a:pPr marL="0" indent="0" algn="l" rtl="0">
+              <a:buNone/>
+            </a:pPr>
+            <a:endParaRPr lang="en-US" sz="2800" dirty="0" smtClean="0"/>
+          </a:p>
+        </p:txBody>
+      </p:sp>
+      <p:sp>
+        <p:nvSpPr>
+          <p:cNvPr id="4" name="Date Placeholder 3"/>
+          <p:cNvSpPr>
+            <a:spLocks noGrp="1"/>
+          </p:cNvSpPr>
+          <p:nvPr>
+            <p:ph type="dt" sz="half" idx="10"/>
+          </p:nvPr>
+        </p:nvSpPr>
+        <p:spPr/>
+        <p:txBody>
+          <a:bodyPr/>
+          <a:lstStyle/>
+          <a:p>
+            <a:pPr rtl="0"/>
+            <a:r>
+              <a:rPr lang="he-IL" dirty="0" smtClean="0"/>
+              <a:t>SIDEER 2013</a:t>
+            </a:r>
+            <a:endParaRPr lang="he-IL" dirty="0"/>
+          </a:p>
+        </p:txBody>
+      </p:sp>
+      <p:sp>
+        <p:nvSpPr>
+          <p:cNvPr id="5" name="Footer Placeholder 4"/>
+          <p:cNvSpPr>
+            <a:spLocks noGrp="1"/>
+          </p:cNvSpPr>
+          <p:nvPr>
+            <p:ph type="ftr" sz="quarter" idx="11"/>
+          </p:nvPr>
+        </p:nvSpPr>
+        <p:spPr/>
+        <p:txBody>
+          <a:bodyPr/>
+          <a:lstStyle/>
+          <a:p>
+            <a:pPr algn="l"/>
+            <a:r>
+              <a:rPr lang="en-US" dirty="0" err="1" smtClean="0"/>
+              <a:t>Yoav</a:t>
+            </a:r>
+            <a:r>
+              <a:rPr lang="en-US" dirty="0" smtClean="0"/>
+              <a:t> Ram</a:t>
+            </a:r>
+            <a:endParaRPr lang="he-IL" dirty="0"/>
+          </a:p>
+        </p:txBody>
+      </p:sp>
+      <p:sp>
+        <p:nvSpPr>
+          <p:cNvPr id="6" name="Slide Number Placeholder 5"/>
+          <p:cNvSpPr>
+            <a:spLocks noGrp="1"/>
+          </p:cNvSpPr>
+          <p:nvPr>
+            <p:ph type="sldNum" sz="quarter" idx="12"/>
+          </p:nvPr>
+        </p:nvSpPr>
+        <p:spPr/>
+        <p:txBody>
+          <a:bodyPr/>
+          <a:lstStyle/>
+          <a:p>
+            <a:pPr algn="r"/>
+            <a:fld id="{DDDA39DD-F56F-4D5B-9830-607597A41E0F}" type="slidenum">
+              <a:rPr lang="he-IL" smtClean="0"/>
+              <a:pPr algn="r"/>
+              <a:t>12</a:t>
+            </a:fld>
+            <a:endParaRPr lang="he-IL" dirty="0"/>
+          </a:p>
+        </p:txBody>
+      </p:sp>
+      <p:sp>
+        <p:nvSpPr>
+          <p:cNvPr id="8" name="Title 1"/>
+          <p:cNvSpPr txBox="1">
+            <a:spLocks/>
+          </p:cNvSpPr>
+          <p:nvPr/>
+        </p:nvSpPr>
+        <p:spPr>
+          <a:xfrm>
+            <a:off x="475830" y="6155"/>
+            <a:ext cx="8229600" cy="1143000"/>
+          </a:xfrm>
+          <a:prstGeom prst="rect">
+            <a:avLst/>
+          </a:prstGeom>
+        </p:spPr>
+        <p:txBody>
+          <a:bodyPr vert="horz" lIns="91440" tIns="45720" rIns="91440" bIns="45720" rtlCol="0" anchor="ctr">
+            <a:normAutofit fontScale="97500"/>
+          </a:bodyPr>
+          <a:lstStyle>
+            <a:lvl1pPr algn="ctr" defTabSz="914400" rtl="0" eaLnBrk="1" latinLnBrk="0" hangingPunct="1">
+              <a:spcBef>
+                <a:spcPct val="0"/>
+              </a:spcBef>
+              <a:buNone/>
+              <a:defRPr sz="4400" kern="1200">
+                <a:solidFill>
+                  <a:schemeClr val="tx1"/>
+                </a:solidFill>
+                <a:latin typeface="+mj-lt"/>
+                <a:ea typeface="+mj-ea"/>
+                <a:cs typeface="+mj-cs"/>
+              </a:defRPr>
+            </a:lvl1pPr>
+          </a:lstStyle>
+          <a:p>
+            <a:pPr>
+              <a:spcBef>
+                <a:spcPts val="0"/>
+              </a:spcBef>
+            </a:pPr>
+            <a:endParaRPr lang="en-US" sz="1800" dirty="0" smtClean="0">
+              <a:solidFill>
+                <a:prstClr val="black"/>
+              </a:solidFill>
+            </a:endParaRPr>
+          </a:p>
+        </p:txBody>
+      </p:sp>
+    </p:spTree>
+    <p:extLst>
+      <p:ext uri="{BB962C8B-B14F-4D97-AF65-F5344CB8AC3E}">
+        <p14:creationId xmlns:p14="http://schemas.microsoft.com/office/powerpoint/2010/main" val="4109014907"/>
+      </p:ext>
+    </p:extLst>
+  </p:cSld>
+  <p:clrMapOvr>
+    <a:masterClrMapping/>
+  </p:clrMapOvr>
+  <p:timing>
+    <p:tnLst>
+      <p:par>
+        <p:cTn id="1" dur="indefinite" restart="never" nodeType="tmRoot"/>
+      </p:par>
+    </p:tnLst>
+  </p:timing>
+</p:sld>
+</file>
+
+<file path=ppt/slides/slide13.xml><?xml version="1.0" encoding="utf-8"?>
+<p:sld xmlns:a="http://schemas.openxmlformats.org/drawingml/2006/main" xmlns:r="http://schemas.openxmlformats.org/officeDocument/2006/relationships" xmlns:p="http://schemas.openxmlformats.org/presentationml/2006/main">
+  <p:cSld>
+    <p:spTree>
+      <p:nvGrpSpPr>
+        <p:cNvPr id="1" name=""/>
+        <p:cNvGrpSpPr/>
+        <p:nvPr/>
+      </p:nvGrpSpPr>
+      <p:grpSpPr>
+        <a:xfrm>
+          <a:off x="0" y="0"/>
+          <a:ext cx="0" cy="0"/>
+          <a:chOff x="0" y="0"/>
+          <a:chExt cx="0" cy="0"/>
+        </a:xfrm>
+      </p:grpSpPr>
+      <p:sp>
+        <p:nvSpPr>
+          <p:cNvPr id="2" name="Title 1"/>
+          <p:cNvSpPr>
+            <a:spLocks noGrp="1"/>
+          </p:cNvSpPr>
+          <p:nvPr>
+            <p:ph type="title"/>
+          </p:nvPr>
+        </p:nvSpPr>
+        <p:spPr/>
+        <p:txBody>
+          <a:bodyPr/>
+          <a:lstStyle/>
+          <a:p>
+            <a:pPr rtl="0"/>
+            <a:r>
+              <a:rPr lang="en-US" dirty="0" smtClean="0"/>
+              <a:t>Competitions Summary</a:t>
+            </a:r>
+            <a:endParaRPr lang="he-IL" dirty="0"/>
+          </a:p>
+        </p:txBody>
+      </p:sp>
+      <p:sp>
+        <p:nvSpPr>
+          <p:cNvPr id="4" name="Date Placeholder 3"/>
+          <p:cNvSpPr>
+            <a:spLocks noGrp="1"/>
+          </p:cNvSpPr>
+          <p:nvPr>
+            <p:ph type="dt" sz="half" idx="10"/>
+          </p:nvPr>
+        </p:nvSpPr>
+        <p:spPr/>
+        <p:txBody>
+          <a:bodyPr/>
+          <a:lstStyle/>
+          <a:p>
+            <a:pPr rtl="0"/>
+            <a:r>
+              <a:rPr lang="he-IL" dirty="0" smtClean="0"/>
+              <a:t>SIDEER 2013</a:t>
+            </a:r>
+            <a:endParaRPr lang="he-IL" dirty="0"/>
+          </a:p>
+        </p:txBody>
+      </p:sp>
+      <p:sp>
+        <p:nvSpPr>
+          <p:cNvPr id="5" name="Footer Placeholder 4"/>
+          <p:cNvSpPr>
+            <a:spLocks noGrp="1"/>
+          </p:cNvSpPr>
+          <p:nvPr>
+            <p:ph type="ftr" sz="quarter" idx="11"/>
+          </p:nvPr>
+        </p:nvSpPr>
+        <p:spPr/>
+        <p:txBody>
+          <a:bodyPr/>
+          <a:lstStyle/>
+          <a:p>
+            <a:pPr algn="l"/>
+            <a:r>
+              <a:rPr lang="en-US" dirty="0" err="1" smtClean="0"/>
+              <a:t>Yoav</a:t>
+            </a:r>
+            <a:r>
+              <a:rPr lang="en-US" dirty="0" smtClean="0"/>
+              <a:t> Ram</a:t>
+            </a:r>
+            <a:endParaRPr lang="he-IL" dirty="0"/>
+          </a:p>
+        </p:txBody>
+      </p:sp>
+      <p:sp>
+        <p:nvSpPr>
+          <p:cNvPr id="6" name="Slide Number Placeholder 5"/>
+          <p:cNvSpPr>
+            <a:spLocks noGrp="1"/>
+          </p:cNvSpPr>
+          <p:nvPr>
+            <p:ph type="sldNum" sz="quarter" idx="12"/>
+          </p:nvPr>
+        </p:nvSpPr>
+        <p:spPr/>
+        <p:txBody>
+          <a:bodyPr/>
+          <a:lstStyle/>
+          <a:p>
+            <a:pPr algn="r"/>
+            <a:fld id="{DDDA39DD-F56F-4D5B-9830-607597A41E0F}" type="slidenum">
+              <a:rPr lang="he-IL" smtClean="0"/>
+              <a:pPr algn="r"/>
+              <a:t>13</a:t>
+            </a:fld>
+            <a:endParaRPr lang="he-IL" dirty="0"/>
+          </a:p>
+        </p:txBody>
+      </p:sp>
+      <p:pic>
+        <p:nvPicPr>
+          <p:cNvPr id="8" name="Picture 9"/>
+          <p:cNvPicPr>
+            <a:picLocks noChangeAspect="1" noChangeArrowheads="1"/>
+          </p:cNvPicPr>
+          <p:nvPr/>
+        </p:nvPicPr>
+        <p:blipFill>
+          <a:blip r:embed="rId3">
+            <a:extLst>
+              <a:ext uri="{28A0092B-C50C-407E-A947-70E740481C1C}">
+                <a14:useLocalDpi xmlns:a14="http://schemas.microsoft.com/office/drawing/2010/main" val="0"/>
+              </a:ext>
+            </a:extLst>
+          </a:blip>
+          <a:srcRect/>
+          <a:stretch>
+            <a:fillRect/>
+          </a:stretch>
+        </p:blipFill>
+        <p:spPr bwMode="auto">
+          <a:xfrm>
+            <a:off x="1043608" y="1614507"/>
+            <a:ext cx="7101860" cy="5054853"/>
+          </a:xfrm>
+          <a:prstGeom prst="rect">
+            <a:avLst/>
+          </a:prstGeom>
+          <a:noFill/>
+          <a:ln>
+            <a:noFill/>
+          </a:ln>
+          <a:effectLst/>
+          <a:extLst>
+            <a:ext uri="{909E8E84-426E-40DD-AFC4-6F175D3DCCD1}">
+              <a14:hiddenFill xmlns:a14="http://schemas.microsoft.com/office/drawing/2010/main">
+                <a:solidFill>
+                  <a:schemeClr val="accent1"/>
+                </a:solidFill>
+              </a14:hiddenFill>
+            </a:ext>
+            <a:ext uri="{91240B29-F687-4F45-9708-019B960494DF}">
+              <a14:hiddenLine xmlns:a14="http://schemas.microsoft.com/office/drawing/2010/main" w="9525">
+                <a:solidFill>
+                  <a:schemeClr val="tx1"/>
+                </a:solidFill>
+                <a:miter lim="800000"/>
+                <a:headEnd/>
+                <a:tailEnd/>
+              </a14:hiddenLine>
+            </a:ext>
+            <a:ext uri="{AF507438-7753-43E0-B8FC-AC1667EBCBE1}">
+              <a14:hiddenEffects xmlns:a14="http://schemas.microsoft.com/office/drawing/2010/main">
+                <a:effectLst>
+                  <a:outerShdw dist="35921" dir="2700000" algn="ctr" rotWithShape="0">
+                    <a:schemeClr val="bg2"/>
+                  </a:outerShdw>
+                </a:effectLst>
+              </a14:hiddenEffects>
+            </a:ext>
+          </a:extLst>
+        </p:spPr>
+      </p:pic>
+    </p:spTree>
+    <p:extLst>
+      <p:ext uri="{BB962C8B-B14F-4D97-AF65-F5344CB8AC3E}">
+        <p14:creationId xmlns:p14="http://schemas.microsoft.com/office/powerpoint/2010/main" val="3434376425"/>
+      </p:ext>
+    </p:extLst>
+  </p:cSld>
+  <p:clrMapOvr>
+    <a:masterClrMapping/>
+  </p:clrMapOvr>
+  <p:timing>
+    <p:tnLst>
+      <p:par>
+        <p:cTn id="1" dur="indefinite" restart="never" nodeType="tmRoot"/>
+      </p:par>
+    </p:tnLst>
+  </p:timing>
+</p:sld>
+</file>
+
+<file path=ppt/slides/slide14.xml><?xml version="1.0" encoding="utf-8"?>
+<p:sld xmlns:a="http://schemas.openxmlformats.org/drawingml/2006/main" xmlns:r="http://schemas.openxmlformats.org/officeDocument/2006/relationships" xmlns:p="http://schemas.openxmlformats.org/presentationml/2006/main">
+  <p:cSld>
+    <p:spTree>
+      <p:nvGrpSpPr>
+        <p:cNvPr id="1" name=""/>
+        <p:cNvGrpSpPr/>
+        <p:nvPr/>
+      </p:nvGrpSpPr>
+      <p:grpSpPr>
+        <a:xfrm>
+          <a:off x="0" y="0"/>
+          <a:ext cx="0" cy="0"/>
+          <a:chOff x="0" y="0"/>
+          <a:chExt cx="0" cy="0"/>
+        </a:xfrm>
+      </p:grpSpPr>
+      <p:sp>
+        <p:nvSpPr>
+          <p:cNvPr id="2" name="Title 1"/>
+          <p:cNvSpPr>
+            <a:spLocks noGrp="1"/>
+          </p:cNvSpPr>
+          <p:nvPr>
+            <p:ph type="title"/>
+          </p:nvPr>
+        </p:nvSpPr>
+        <p:spPr/>
+        <p:txBody>
+          <a:bodyPr/>
+          <a:lstStyle/>
+          <a:p>
+            <a:pPr rtl="0"/>
+            <a:r>
+              <a:rPr lang="en-US" dirty="0" smtClean="0"/>
+              <a:t>Evolution of Stress-Induced Mutation</a:t>
+            </a:r>
+            <a:endParaRPr lang="he-IL" dirty="0"/>
+          </a:p>
+        </p:txBody>
+      </p:sp>
+      <p:sp>
+        <p:nvSpPr>
+          <p:cNvPr id="3" name="Content Placeholder 2"/>
+          <p:cNvSpPr>
+            <a:spLocks noGrp="1"/>
+          </p:cNvSpPr>
+          <p:nvPr>
+            <p:ph idx="1"/>
+          </p:nvPr>
+        </p:nvSpPr>
+        <p:spPr/>
+        <p:txBody>
+          <a:bodyPr>
+            <a:normAutofit/>
+          </a:bodyPr>
+          <a:lstStyle/>
+          <a:p>
+            <a:pPr marL="0" indent="0" algn="l" rtl="0">
+              <a:buNone/>
+            </a:pPr>
+            <a:endParaRPr lang="en-US" sz="2800" dirty="0"/>
+          </a:p>
+        </p:txBody>
+      </p:sp>
+      <p:sp>
+        <p:nvSpPr>
+          <p:cNvPr id="4" name="Date Placeholder 3"/>
+          <p:cNvSpPr>
+            <a:spLocks noGrp="1"/>
+          </p:cNvSpPr>
+          <p:nvPr>
+            <p:ph type="dt" sz="half" idx="10"/>
+          </p:nvPr>
+        </p:nvSpPr>
+        <p:spPr/>
+        <p:txBody>
+          <a:bodyPr/>
+          <a:lstStyle/>
+          <a:p>
+            <a:pPr rtl="0"/>
+            <a:r>
+              <a:rPr lang="he-IL" dirty="0" smtClean="0"/>
+              <a:t>SIDEER 2013</a:t>
+            </a:r>
+            <a:endParaRPr lang="he-IL" dirty="0"/>
+          </a:p>
+        </p:txBody>
+      </p:sp>
+      <p:sp>
+        <p:nvSpPr>
+          <p:cNvPr id="5" name="Footer Placeholder 4"/>
+          <p:cNvSpPr>
+            <a:spLocks noGrp="1"/>
+          </p:cNvSpPr>
+          <p:nvPr>
+            <p:ph type="ftr" sz="quarter" idx="11"/>
+          </p:nvPr>
+        </p:nvSpPr>
+        <p:spPr/>
+        <p:txBody>
+          <a:bodyPr/>
+          <a:lstStyle/>
+          <a:p>
+            <a:pPr algn="l"/>
+            <a:r>
+              <a:rPr lang="en-US" dirty="0" err="1" smtClean="0"/>
+              <a:t>Yoav</a:t>
+            </a:r>
+            <a:r>
+              <a:rPr lang="en-US" dirty="0" smtClean="0"/>
+              <a:t> Ram</a:t>
+            </a:r>
+            <a:endParaRPr lang="he-IL" dirty="0"/>
+          </a:p>
+        </p:txBody>
+      </p:sp>
+      <p:sp>
+        <p:nvSpPr>
+          <p:cNvPr id="6" name="Slide Number Placeholder 5"/>
+          <p:cNvSpPr>
+            <a:spLocks noGrp="1"/>
+          </p:cNvSpPr>
+          <p:nvPr>
+            <p:ph type="sldNum" sz="quarter" idx="12"/>
+          </p:nvPr>
+        </p:nvSpPr>
+        <p:spPr/>
+        <p:txBody>
+          <a:bodyPr/>
+          <a:lstStyle/>
+          <a:p>
+            <a:pPr algn="r"/>
+            <a:fld id="{DDDA39DD-F56F-4D5B-9830-607597A41E0F}" type="slidenum">
+              <a:rPr lang="he-IL" smtClean="0"/>
+              <a:pPr algn="r"/>
+              <a:t>14</a:t>
+            </a:fld>
+            <a:endParaRPr lang="he-IL" dirty="0"/>
+          </a:p>
+        </p:txBody>
+      </p:sp>
+      <p:sp>
+        <p:nvSpPr>
+          <p:cNvPr id="16" name="Rectangle 15"/>
+          <p:cNvSpPr/>
+          <p:nvPr/>
+        </p:nvSpPr>
+        <p:spPr>
+          <a:xfrm>
+            <a:off x="5508104" y="6309320"/>
+            <a:ext cx="3386376" cy="369332"/>
+          </a:xfrm>
+          <a:prstGeom prst="rect">
+            <a:avLst/>
+          </a:prstGeom>
+        </p:spPr>
+        <p:txBody>
+          <a:bodyPr wrap="none">
+            <a:spAutoFit/>
+          </a:bodyPr>
+          <a:lstStyle/>
+          <a:p>
+            <a:pPr algn="l" rtl="0"/>
+            <a:r>
+              <a:rPr lang="en-US" dirty="0"/>
+              <a:t>Ram &amp; </a:t>
+            </a:r>
+            <a:r>
+              <a:rPr lang="en-US" dirty="0" err="1"/>
+              <a:t>Hadany</a:t>
+            </a:r>
+            <a:r>
+              <a:rPr lang="en-US" dirty="0"/>
+              <a:t>, </a:t>
+            </a:r>
+            <a:r>
+              <a:rPr lang="en-US" i="1" dirty="0"/>
+              <a:t>Evolution </a:t>
+            </a:r>
+            <a:r>
+              <a:rPr lang="en-US" dirty="0"/>
+              <a:t>2012</a:t>
+            </a:r>
+          </a:p>
+        </p:txBody>
+      </p:sp>
+    </p:spTree>
+    <p:extLst>
+      <p:ext uri="{BB962C8B-B14F-4D97-AF65-F5344CB8AC3E}">
+        <p14:creationId xmlns:p14="http://schemas.microsoft.com/office/powerpoint/2010/main" val="4197937055"/>
+      </p:ext>
+    </p:extLst>
+  </p:cSld>
+  <p:clrMapOvr>
+    <a:masterClrMapping/>
+  </p:clrMapOvr>
+  <p:timing>
+    <p:tnLst>
+      <p:par>
+        <p:cTn id="1" dur="indefinite" restart="never" nodeType="tmRoot"/>
+      </p:par>
+    </p:tnLst>
+  </p:timing>
+</p:sld>
+</file>
+
 <file path=ppt/slides/slide2.xml><?xml version="1.0" encoding="utf-8"?>
 <p:sld xmlns:a="http://schemas.openxmlformats.org/drawingml/2006/main" xmlns:r="http://schemas.openxmlformats.org/officeDocument/2006/relationships" xmlns:p="http://schemas.openxmlformats.org/presentationml/2006/main">
   <p:cSld>
@@ -4192,6 +6732,83 @@
           </a:extLst>
         </p:spPr>
       </p:pic>
+      <p:sp>
+        <p:nvSpPr>
+          <p:cNvPr id="5" name="Date Placeholder 4"/>
+          <p:cNvSpPr>
+            <a:spLocks noGrp="1"/>
+          </p:cNvSpPr>
+          <p:nvPr>
+            <p:ph type="dt" sz="half" idx="10"/>
+          </p:nvPr>
+        </p:nvSpPr>
+        <p:spPr/>
+        <p:txBody>
+          <a:bodyPr/>
+          <a:lstStyle/>
+          <a:p>
+            <a:pPr rtl="0"/>
+            <a:r>
+              <a:rPr lang="he-IL" dirty="0" smtClean="0"/>
+              <a:t>SIDEER 2013</a:t>
+            </a:r>
+            <a:endParaRPr lang="he-IL" dirty="0"/>
+          </a:p>
+        </p:txBody>
+      </p:sp>
+      <p:sp>
+        <p:nvSpPr>
+          <p:cNvPr id="7" name="Footer Placeholder 6"/>
+          <p:cNvSpPr>
+            <a:spLocks noGrp="1"/>
+          </p:cNvSpPr>
+          <p:nvPr>
+            <p:ph type="ftr" sz="quarter" idx="11"/>
+          </p:nvPr>
+        </p:nvSpPr>
+        <p:spPr/>
+        <p:txBody>
+          <a:bodyPr/>
+          <a:lstStyle/>
+          <a:p>
+            <a:pPr algn="l"/>
+            <a:r>
+              <a:rPr lang="en-US" dirty="0" err="1" smtClean="0"/>
+              <a:t>Yoav</a:t>
+            </a:r>
+            <a:r>
+              <a:rPr lang="en-US" dirty="0" smtClean="0"/>
+              <a:t> Ram</a:t>
+            </a:r>
+            <a:endParaRPr lang="he-IL" dirty="0"/>
+          </a:p>
+        </p:txBody>
+      </p:sp>
+      <p:sp>
+        <p:nvSpPr>
+          <p:cNvPr id="8" name="Slide Number Placeholder 7"/>
+          <p:cNvSpPr>
+            <a:spLocks noGrp="1"/>
+          </p:cNvSpPr>
+          <p:nvPr>
+            <p:ph type="sldNum" sz="quarter" idx="12"/>
+          </p:nvPr>
+        </p:nvSpPr>
+        <p:spPr/>
+        <p:txBody>
+          <a:bodyPr/>
+          <a:lstStyle/>
+          <a:p>
+            <a:pPr algn="r"/>
+            <a:fld id="{DDDA39DD-F56F-4D5B-9830-607597A41E0F}" type="slidenum">
+              <a:rPr lang="he-IL" smtClean="0"/>
+              <a:pPr algn="r"/>
+              <a:t>2</a:t>
+            </a:fld>
+            <a:endParaRPr lang="he-IL" dirty="0"/>
+          </a:p>
+        </p:txBody>
+      </p:sp>
     </p:spTree>
     <p:extLst>
       <p:ext uri="{BB962C8B-B14F-4D97-AF65-F5344CB8AC3E}">
@@ -4621,6 +7238,13 @@
   <p:clrMapOvr>
     <a:masterClrMapping/>
   </p:clrMapOvr>
+  <p:timing>
+    <p:tnLst>
+      <p:par>
+        <p:cTn id="1" dur="indefinite" restart="never" nodeType="tmRoot"/>
+      </p:par>
+    </p:tnLst>
+  </p:timing>
 </p:sld>
 </file>
 
@@ -4735,11 +7359,12 @@
           <a:bodyPr/>
           <a:lstStyle/>
           <a:p>
-            <a:r>
-              <a:rPr lang="he-IL" smtClean="0"/>
+            <a:pPr rtl="0"/>
+            <a:r>
+              <a:rPr lang="he-IL" dirty="0" smtClean="0"/>
               <a:t>SIDEER 2013</a:t>
             </a:r>
-            <a:endParaRPr lang="he-IL"/>
+            <a:endParaRPr lang="he-IL" dirty="0"/>
           </a:p>
         </p:txBody>
       </p:sp>
@@ -4758,6 +7383,7 @@
           <a:bodyPr/>
           <a:lstStyle/>
           <a:p>
+            <a:pPr algn="l"/>
             <a:r>
               <a:rPr lang="en-US" smtClean="0"/>
               <a:t>Yoav Ram</a:t>
@@ -4781,11 +7407,13 @@
           <a:bodyPr/>
           <a:lstStyle/>
           <a:p>
+            <a:pPr algn="r"/>
             <a:fld id="{DDDA39DD-F56F-4D5B-9830-607597A41E0F}" type="slidenum">
               <a:rPr lang="he-IL" smtClean="0"/>
+              <a:pPr algn="r"/>
               <a:t>4</a:t>
             </a:fld>
-            <a:endParaRPr lang="he-IL"/>
+            <a:endParaRPr lang="he-IL" dirty="0"/>
           </a:p>
         </p:txBody>
       </p:sp>
@@ -4898,6 +7526,13 @@
   <p:clrMapOvr>
     <a:masterClrMapping/>
   </p:clrMapOvr>
+  <p:timing>
+    <p:tnLst>
+      <p:par>
+        <p:cTn id="1" dur="indefinite" restart="never" nodeType="tmRoot"/>
+      </p:par>
+    </p:tnLst>
+  </p:timing>
 </p:sld>
 </file>
 
@@ -4962,14 +7597,14 @@
             <a:pPr rtl="0"/>
             <a:r>
               <a:rPr lang="en-US" dirty="0" smtClean="0"/>
-              <a:t>SIDEER</a:t>
+              <a:t>SIDEER </a:t>
             </a:r>
             <a:r>
               <a:rPr lang="he-IL" dirty="0" smtClean="0"/>
               <a:t> </a:t>
             </a:r>
             <a:r>
-              <a:rPr lang="en-US" dirty="0" smtClean="0"/>
+              <a:rPr lang="he-IL" dirty="0" smtClean="0"/>
               <a:t> </a:t>
             </a:r>
             <a:r>
@@ -4995,7 +7630,7 @@
           <a:bodyPr/>
           <a:lstStyle/>
           <a:p>
-            <a:pPr rtl="0"/>
+            <a:pPr algn="l" rtl="0"/>
             <a:r>
               <a:rPr lang="en-US" smtClean="0"/>
               <a:t>Yoav Ram</a:t>
@@ -5019,13 +7654,13 @@
           <a:bodyPr/>
           <a:lstStyle/>
           <a:p>
-            <a:pPr rtl="0"/>
+            <a:pPr algn="r" rtl="0"/>
             <a:fld id="{DDDA39DD-F56F-4D5B-9830-607597A41E0F}" type="slidenum">
               <a:rPr lang="he-IL" smtClean="0"/>
-              <a:pPr rtl="0"/>
+              <a:pPr algn="r" rtl="0"/>
               <a:t>5</a:t>
             </a:fld>
-            <a:endParaRPr lang="he-IL"/>
+            <a:endParaRPr lang="he-IL" dirty="0"/>
           </a:p>
         </p:txBody>
       </p:sp>
@@ -5142,6 +7777,2168 @@
   <p:clrMapOvr>
     <a:masterClrMapping/>
   </p:clrMapOvr>
+  <p:timing>
+    <p:tnLst>
+      <p:par>
+        <p:cTn id="1" dur="indefinite" restart="never" nodeType="tmRoot"/>
+      </p:par>
+    </p:tnLst>
+  </p:timing>
+</p:sld>
+</file>
+
+<file path=ppt/slides/slide6.xml><?xml version="1.0" encoding="utf-8"?>
+<p:sld xmlns:a="http://schemas.openxmlformats.org/drawingml/2006/main" xmlns:r="http://schemas.openxmlformats.org/officeDocument/2006/relationships" xmlns:p="http://schemas.openxmlformats.org/presentationml/2006/main">
+  <p:cSld>
+    <p:spTree>
+      <p:nvGrpSpPr>
+        <p:cNvPr id="1" name=""/>
+        <p:cNvGrpSpPr/>
+        <p:nvPr/>
+      </p:nvGrpSpPr>
+      <p:grpSpPr>
+        <a:xfrm>
+          <a:off x="0" y="0"/>
+          <a:ext cx="0" cy="0"/>
+          <a:chOff x="0" y="0"/>
+          <a:chExt cx="0" cy="0"/>
+        </a:xfrm>
+      </p:grpSpPr>
+      <p:sp>
+        <p:nvSpPr>
+          <p:cNvPr id="2" name="Title 1"/>
+          <p:cNvSpPr>
+            <a:spLocks noGrp="1"/>
+          </p:cNvSpPr>
+          <p:nvPr>
+            <p:ph type="title"/>
+          </p:nvPr>
+        </p:nvSpPr>
+        <p:spPr/>
+        <p:txBody>
+          <a:bodyPr/>
+          <a:lstStyle/>
+          <a:p>
+            <a:r>
+              <a:rPr lang="en-US" dirty="0" smtClean="0"/>
+              <a:t>Stress-induced mutation</a:t>
+            </a:r>
+            <a:endParaRPr lang="he-IL" dirty="0"/>
+          </a:p>
+        </p:txBody>
+      </p:sp>
+      <p:sp>
+        <p:nvSpPr>
+          <p:cNvPr id="3" name="Content Placeholder 2"/>
+          <p:cNvSpPr>
+            <a:spLocks noGrp="1"/>
+          </p:cNvSpPr>
+          <p:nvPr>
+            <p:ph idx="1"/>
+          </p:nvPr>
+        </p:nvSpPr>
+        <p:spPr>
+          <a:xfrm>
+            <a:off x="457200" y="1600200"/>
+            <a:ext cx="4114800" cy="4876800"/>
+          </a:xfrm>
+        </p:spPr>
+        <p:txBody>
+          <a:bodyPr>
+            <a:normAutofit/>
+          </a:bodyPr>
+          <a:lstStyle/>
+          <a:p>
+            <a:pPr marL="0" indent="0" algn="l" rtl="0">
+              <a:buNone/>
+            </a:pPr>
+            <a:r>
+              <a:rPr lang="en-US" sz="3600" dirty="0" smtClean="0"/>
+              <a:t>Error prone DNA polymerases are induced by stress responses: </a:t>
+            </a:r>
+          </a:p>
+          <a:p>
+            <a:pPr lvl="1" algn="l" rtl="0"/>
+            <a:r>
+              <a:rPr lang="en-US" sz="3200" dirty="0" smtClean="0"/>
+              <a:t>SOS response</a:t>
+            </a:r>
+          </a:p>
+          <a:p>
+            <a:pPr lvl="1" algn="l" rtl="0"/>
+            <a:r>
+              <a:rPr lang="en-US" sz="3200" dirty="0" smtClean="0"/>
+              <a:t>Carbon starvation</a:t>
+            </a:r>
+          </a:p>
+          <a:p>
+            <a:pPr lvl="1" algn="l" rtl="0"/>
+            <a:r>
+              <a:rPr lang="en-US" sz="3200" dirty="0" smtClean="0"/>
+              <a:t>DNA damage</a:t>
+            </a:r>
+          </a:p>
+          <a:p>
+            <a:pPr marL="0" indent="0" algn="l" rtl="0">
+              <a:buNone/>
+            </a:pPr>
+            <a:r>
+              <a:rPr lang="en-US" sz="3600" dirty="0" smtClean="0"/>
+              <a:t>In </a:t>
+            </a:r>
+            <a:r>
+              <a:rPr lang="en-US" sz="3600" i="1" dirty="0" smtClean="0"/>
+              <a:t>E. coli</a:t>
+            </a:r>
+            <a:endParaRPr lang="en-US" sz="3600" dirty="0" smtClean="0"/>
+          </a:p>
+          <a:p>
+            <a:pPr algn="l" rtl="0"/>
+            <a:endParaRPr lang="en-US" sz="3600" dirty="0" smtClean="0"/>
+          </a:p>
+          <a:p>
+            <a:pPr marL="274320" lvl="1" indent="0" algn="l" rtl="0">
+              <a:buNone/>
+            </a:pPr>
+            <a:endParaRPr lang="en-US" sz="3200" dirty="0" smtClean="0"/>
+          </a:p>
+        </p:txBody>
+      </p:sp>
+      <p:sp>
+        <p:nvSpPr>
+          <p:cNvPr id="4" name="Date Placeholder 3"/>
+          <p:cNvSpPr>
+            <a:spLocks noGrp="1"/>
+          </p:cNvSpPr>
+          <p:nvPr>
+            <p:ph type="dt" sz="half" idx="10"/>
+          </p:nvPr>
+        </p:nvSpPr>
+        <p:spPr/>
+        <p:txBody>
+          <a:bodyPr/>
+          <a:lstStyle/>
+          <a:p>
+            <a:pPr rtl="0"/>
+            <a:r>
+              <a:rPr lang="he-IL" dirty="0" smtClean="0"/>
+              <a:t>SIDEER 2013</a:t>
+            </a:r>
+            <a:endParaRPr lang="he-IL" dirty="0"/>
+          </a:p>
+        </p:txBody>
+      </p:sp>
+      <p:sp>
+        <p:nvSpPr>
+          <p:cNvPr id="5" name="Footer Placeholder 4"/>
+          <p:cNvSpPr>
+            <a:spLocks noGrp="1"/>
+          </p:cNvSpPr>
+          <p:nvPr>
+            <p:ph type="ftr" sz="quarter" idx="11"/>
+          </p:nvPr>
+        </p:nvSpPr>
+        <p:spPr/>
+        <p:txBody>
+          <a:bodyPr/>
+          <a:lstStyle/>
+          <a:p>
+            <a:pPr algn="l"/>
+            <a:r>
+              <a:rPr lang="en-US" dirty="0" err="1" smtClean="0"/>
+              <a:t>Yoav</a:t>
+            </a:r>
+            <a:r>
+              <a:rPr lang="en-US" dirty="0" smtClean="0"/>
+              <a:t> Ram</a:t>
+            </a:r>
+            <a:endParaRPr lang="he-IL" dirty="0"/>
+          </a:p>
+        </p:txBody>
+      </p:sp>
+      <p:sp>
+        <p:nvSpPr>
+          <p:cNvPr id="6" name="Slide Number Placeholder 5"/>
+          <p:cNvSpPr>
+            <a:spLocks noGrp="1"/>
+          </p:cNvSpPr>
+          <p:nvPr>
+            <p:ph type="sldNum" sz="quarter" idx="12"/>
+          </p:nvPr>
+        </p:nvSpPr>
+        <p:spPr/>
+        <p:txBody>
+          <a:bodyPr/>
+          <a:lstStyle/>
+          <a:p>
+            <a:pPr algn="r"/>
+            <a:fld id="{DDDA39DD-F56F-4D5B-9830-607597A41E0F}" type="slidenum">
+              <a:rPr lang="he-IL" smtClean="0"/>
+              <a:pPr algn="r"/>
+              <a:t>6</a:t>
+            </a:fld>
+            <a:endParaRPr lang="he-IL" dirty="0"/>
+          </a:p>
+        </p:txBody>
+      </p:sp>
+      <p:pic>
+        <p:nvPicPr>
+          <p:cNvPr id="3076" name="Picture 4" descr="http://onlinelibrary.wiley.com/store/10.1002/bies.201200050/asset/image_n/nfig001.jpg?v=1&amp;t=he5yybpm&amp;s=23eafa16a8b82098ff5b089e3909b477f081dc33"/>
+          <p:cNvPicPr>
+            <a:picLocks noChangeAspect="1" noChangeArrowheads="1"/>
+          </p:cNvPicPr>
+          <p:nvPr/>
+        </p:nvPicPr>
+        <p:blipFill>
+          <a:blip r:embed="rId2">
+            <a:extLst>
+              <a:ext uri="{28A0092B-C50C-407E-A947-70E740481C1C}">
+                <a14:useLocalDpi xmlns:a14="http://schemas.microsoft.com/office/drawing/2010/main" val="0"/>
+              </a:ext>
+            </a:extLst>
+          </a:blip>
+          <a:srcRect/>
+          <a:stretch>
+            <a:fillRect/>
+          </a:stretch>
+        </p:blipFill>
+        <p:spPr bwMode="auto">
+          <a:xfrm>
+            <a:off x="4716016" y="1354661"/>
+            <a:ext cx="4220750" cy="5314699"/>
+          </a:xfrm>
+          <a:prstGeom prst="rect">
+            <a:avLst/>
+          </a:prstGeom>
+          <a:noFill/>
+          <a:extLst>
+            <a:ext uri="{909E8E84-426E-40DD-AFC4-6F175D3DCCD1}">
+              <a14:hiddenFill xmlns:a14="http://schemas.microsoft.com/office/drawing/2010/main">
+                <a:solidFill>
+                  <a:srgbClr val="FFFFFF"/>
+                </a:solidFill>
+              </a14:hiddenFill>
+            </a:ext>
+          </a:extLst>
+        </p:spPr>
+      </p:pic>
+      <p:sp>
+        <p:nvSpPr>
+          <p:cNvPr id="7" name="Rectangle 6"/>
+          <p:cNvSpPr/>
+          <p:nvPr/>
+        </p:nvSpPr>
+        <p:spPr>
+          <a:xfrm>
+            <a:off x="6660232" y="1268760"/>
+            <a:ext cx="2808312" cy="369332"/>
+          </a:xfrm>
+          <a:prstGeom prst="rect">
+            <a:avLst/>
+          </a:prstGeom>
+        </p:spPr>
+        <p:txBody>
+          <a:bodyPr wrap="square">
+            <a:spAutoFit/>
+          </a:bodyPr>
+          <a:lstStyle/>
+          <a:p>
+            <a:pPr algn="l" rtl="0"/>
+            <a:r>
+              <a:rPr lang="en-US" i="1" dirty="0" smtClean="0"/>
+              <a:t>Rosenberg et al. 2012</a:t>
+            </a:r>
+            <a:endParaRPr lang="he-IL" i="1" dirty="0"/>
+          </a:p>
+        </p:txBody>
+      </p:sp>
+    </p:spTree>
+    <p:extLst>
+      <p:ext uri="{BB962C8B-B14F-4D97-AF65-F5344CB8AC3E}">
+        <p14:creationId xmlns:p14="http://schemas.microsoft.com/office/powerpoint/2010/main" val="1916502072"/>
+      </p:ext>
+    </p:extLst>
+  </p:cSld>
+  <p:clrMapOvr>
+    <a:masterClrMapping/>
+  </p:clrMapOvr>
+  <p:timing>
+    <p:tnLst>
+      <p:par>
+        <p:cTn id="1" dur="indefinite" restart="never" nodeType="tmRoot"/>
+      </p:par>
+    </p:tnLst>
+  </p:timing>
+</p:sld>
+</file>
+
+<file path=ppt/slides/slide7.xml><?xml version="1.0" encoding="utf-8"?>
+<p:sld xmlns:a="http://schemas.openxmlformats.org/drawingml/2006/main" xmlns:r="http://schemas.openxmlformats.org/officeDocument/2006/relationships" xmlns:p="http://schemas.openxmlformats.org/presentationml/2006/main">
+  <p:cSld>
+    <p:spTree>
+      <p:nvGrpSpPr>
+        <p:cNvPr id="1" name=""/>
+        <p:cNvGrpSpPr/>
+        <p:nvPr/>
+      </p:nvGrpSpPr>
+      <p:grpSpPr>
+        <a:xfrm>
+          <a:off x="0" y="0"/>
+          <a:ext cx="0" cy="0"/>
+          <a:chOff x="0" y="0"/>
+          <a:chExt cx="0" cy="0"/>
+        </a:xfrm>
+      </p:grpSpPr>
+      <p:sp>
+        <p:nvSpPr>
+          <p:cNvPr id="3" name="Content Placeholder 2"/>
+          <p:cNvSpPr>
+            <a:spLocks noGrp="1"/>
+          </p:cNvSpPr>
+          <p:nvPr>
+            <p:ph idx="1"/>
+          </p:nvPr>
+        </p:nvSpPr>
+        <p:spPr>
+          <a:xfrm>
+            <a:off x="457200" y="1628800"/>
+            <a:ext cx="8229600" cy="4968552"/>
+          </a:xfrm>
+        </p:spPr>
+        <p:txBody>
+          <a:bodyPr>
+            <a:noAutofit/>
+          </a:bodyPr>
+          <a:lstStyle/>
+          <a:p>
+            <a:pPr marL="0" lvl="0" indent="0" algn="l" rtl="0">
+              <a:buNone/>
+            </a:pPr>
+            <a:r>
+              <a:rPr lang="en-US" sz="2000" b="1" dirty="0">
+                <a:solidFill>
+                  <a:prstClr val="black"/>
+                </a:solidFill>
+              </a:rPr>
+              <a:t>Bacteria</a:t>
+            </a:r>
+            <a:endParaRPr lang="en-US" sz="1600" b="1" dirty="0">
+              <a:solidFill>
+                <a:prstClr val="black"/>
+              </a:solidFill>
+            </a:endParaRPr>
+          </a:p>
+          <a:p>
+            <a:pPr lvl="0" algn="l" rtl="0"/>
+            <a:r>
+              <a:rPr lang="en-US" sz="1600" i="1" dirty="0" smtClean="0"/>
+              <a:t>Escherichia coli			</a:t>
+            </a:r>
+            <a:r>
+              <a:rPr lang="en-US" sz="1600" i="1" dirty="0" err="1" smtClean="0">
+                <a:solidFill>
+                  <a:prstClr val="black"/>
+                </a:solidFill>
+              </a:rPr>
+              <a:t>Bjedov</a:t>
+            </a:r>
+            <a:r>
+              <a:rPr lang="en-US" sz="1600" i="1" dirty="0" smtClean="0">
+                <a:solidFill>
+                  <a:prstClr val="black"/>
+                </a:solidFill>
+              </a:rPr>
+              <a:t> et al.</a:t>
+            </a:r>
+            <a:r>
+              <a:rPr lang="en-US" sz="1600" dirty="0">
+                <a:solidFill>
+                  <a:prstClr val="black"/>
+                </a:solidFill>
+              </a:rPr>
+              <a:t> </a:t>
+            </a:r>
+            <a:r>
+              <a:rPr lang="en-US" sz="1600" dirty="0" smtClean="0">
+                <a:solidFill>
+                  <a:prstClr val="black"/>
+                </a:solidFill>
+              </a:rPr>
+              <a:t>2003</a:t>
+            </a:r>
+          </a:p>
+          <a:p>
+            <a:pPr algn="l" rtl="0"/>
+            <a:r>
+              <a:rPr lang="en-US" sz="1600" i="1" dirty="0" smtClean="0">
+                <a:solidFill>
+                  <a:prstClr val="black"/>
+                </a:solidFill>
+              </a:rPr>
+              <a:t>Bacillus subtilis 			</a:t>
+            </a:r>
+            <a:r>
+              <a:rPr lang="en-US" sz="1600" i="1" dirty="0">
+                <a:solidFill>
+                  <a:prstClr val="black"/>
+                </a:solidFill>
+              </a:rPr>
+              <a:t>Sung and </a:t>
+            </a:r>
+            <a:r>
+              <a:rPr lang="en-US" sz="1600" i="1" dirty="0" err="1">
+                <a:solidFill>
+                  <a:prstClr val="black"/>
+                </a:solidFill>
+              </a:rPr>
+              <a:t>Yasbin</a:t>
+            </a:r>
+            <a:r>
+              <a:rPr lang="en-US" sz="1600" i="1" dirty="0">
+                <a:solidFill>
+                  <a:prstClr val="black"/>
+                </a:solidFill>
+              </a:rPr>
+              <a:t> 2002</a:t>
+            </a:r>
+          </a:p>
+          <a:p>
+            <a:pPr algn="l" rtl="0"/>
+            <a:r>
+              <a:rPr lang="en-US" sz="1600" i="1" dirty="0"/>
+              <a:t>Pseudomonas putida </a:t>
+            </a:r>
+            <a:r>
+              <a:rPr lang="en-US" sz="1600" i="1" dirty="0" smtClean="0"/>
+              <a:t>		</a:t>
+            </a:r>
+            <a:r>
+              <a:rPr lang="en-US" sz="1600" i="1" dirty="0" err="1" smtClean="0">
+                <a:solidFill>
+                  <a:prstClr val="black"/>
+                </a:solidFill>
+              </a:rPr>
+              <a:t>Kivisaar</a:t>
+            </a:r>
+            <a:r>
+              <a:rPr lang="en-US" sz="1600" i="1" dirty="0" smtClean="0">
+                <a:solidFill>
+                  <a:prstClr val="black"/>
+                </a:solidFill>
+              </a:rPr>
+              <a:t> </a:t>
+            </a:r>
+            <a:r>
+              <a:rPr lang="en-US" sz="1600" i="1" dirty="0" smtClean="0">
+                <a:solidFill>
+                  <a:prstClr val="black"/>
+                </a:solidFill>
+              </a:rPr>
+              <a:t>2010</a:t>
+            </a:r>
+          </a:p>
+          <a:p>
+            <a:pPr algn="l" rtl="0"/>
+            <a:r>
+              <a:rPr lang="en-US" sz="1600" i="1" dirty="0"/>
+              <a:t>Pseudomonas </a:t>
+            </a:r>
+            <a:r>
+              <a:rPr lang="en-US" sz="1600" i="1" dirty="0" err="1" smtClean="0"/>
+              <a:t>aeruginosa</a:t>
+            </a:r>
+            <a:r>
+              <a:rPr lang="en-US" sz="1600" i="1" dirty="0" smtClean="0"/>
+              <a:t>		</a:t>
+            </a:r>
+            <a:r>
+              <a:rPr lang="en-US" sz="1600" i="1" dirty="0" err="1" smtClean="0">
+                <a:solidFill>
+                  <a:prstClr val="black"/>
+                </a:solidFill>
+              </a:rPr>
+              <a:t>Weigand</a:t>
+            </a:r>
+            <a:r>
+              <a:rPr lang="en-US" sz="1600" i="1" dirty="0" smtClean="0">
+                <a:solidFill>
+                  <a:prstClr val="black"/>
+                </a:solidFill>
+              </a:rPr>
+              <a:t> &amp; </a:t>
+            </a:r>
+            <a:r>
+              <a:rPr lang="en-US" sz="1600" i="1" dirty="0" err="1" smtClean="0">
+                <a:solidFill>
+                  <a:prstClr val="black"/>
+                </a:solidFill>
+              </a:rPr>
+              <a:t>Sundin</a:t>
+            </a:r>
+            <a:r>
+              <a:rPr lang="en-US" sz="1600" i="1" dirty="0" smtClean="0">
+                <a:solidFill>
+                  <a:prstClr val="black"/>
+                </a:solidFill>
+              </a:rPr>
+              <a:t> 2012</a:t>
+            </a:r>
+            <a:endParaRPr lang="en-US" sz="1600" i="1" dirty="0"/>
+          </a:p>
+          <a:p>
+            <a:pPr algn="l" rtl="0"/>
+            <a:r>
+              <a:rPr lang="en-US" sz="1600" i="1" dirty="0" smtClean="0">
+                <a:solidFill>
+                  <a:prstClr val="black"/>
+                </a:solidFill>
+              </a:rPr>
+              <a:t>Listeria monocytogenes 		van </a:t>
+            </a:r>
+            <a:r>
+              <a:rPr lang="en-US" sz="1600" i="1" dirty="0">
+                <a:solidFill>
+                  <a:prstClr val="black"/>
+                </a:solidFill>
+              </a:rPr>
+              <a:t>der </a:t>
+            </a:r>
+            <a:r>
+              <a:rPr lang="en-US" sz="1600" i="1" dirty="0" err="1">
+                <a:solidFill>
+                  <a:prstClr val="black"/>
+                </a:solidFill>
+              </a:rPr>
+              <a:t>Veen</a:t>
+            </a:r>
+            <a:r>
+              <a:rPr lang="en-US" sz="1600" i="1" dirty="0">
+                <a:solidFill>
+                  <a:prstClr val="black"/>
+                </a:solidFill>
+              </a:rPr>
+              <a:t> et al. 2010</a:t>
+            </a:r>
+          </a:p>
+          <a:p>
+            <a:pPr algn="l" rtl="0"/>
+            <a:r>
+              <a:rPr lang="en-US" sz="1600" i="1" dirty="0" smtClean="0"/>
+              <a:t>Staphylococcus </a:t>
+            </a:r>
+            <a:r>
+              <a:rPr lang="en-US" sz="1600" i="1" dirty="0" err="1" smtClean="0"/>
+              <a:t>aureus</a:t>
+            </a:r>
+            <a:r>
+              <a:rPr lang="en-US" sz="1600" i="1" dirty="0" smtClean="0"/>
+              <a:t>		</a:t>
+            </a:r>
+            <a:r>
+              <a:rPr lang="en-US" sz="1600" i="1" dirty="0" err="1" smtClean="0">
+                <a:solidFill>
+                  <a:prstClr val="black"/>
+                </a:solidFill>
+              </a:rPr>
+              <a:t>Cirz</a:t>
+            </a:r>
+            <a:r>
+              <a:rPr lang="en-US" sz="1600" i="1" dirty="0" smtClean="0">
+                <a:solidFill>
+                  <a:prstClr val="black"/>
+                </a:solidFill>
+              </a:rPr>
+              <a:t> </a:t>
+            </a:r>
+            <a:r>
+              <a:rPr lang="en-US" sz="1600" i="1" dirty="0">
+                <a:solidFill>
+                  <a:prstClr val="black"/>
+                </a:solidFill>
+              </a:rPr>
+              <a:t>et al. 2007</a:t>
+            </a:r>
+          </a:p>
+          <a:p>
+            <a:pPr algn="l" rtl="0"/>
+            <a:r>
+              <a:rPr lang="en-US" sz="1600" i="1" dirty="0" smtClean="0"/>
+              <a:t>Mycobacterium tuberculosis		</a:t>
+            </a:r>
+            <a:r>
+              <a:rPr lang="en-US" sz="1600" i="1" dirty="0" err="1" smtClean="0">
+                <a:solidFill>
+                  <a:prstClr val="black"/>
+                </a:solidFill>
+              </a:rPr>
+              <a:t>Boshoff</a:t>
+            </a:r>
+            <a:r>
+              <a:rPr lang="en-US" sz="1600" i="1" dirty="0" smtClean="0">
+                <a:solidFill>
+                  <a:prstClr val="black"/>
+                </a:solidFill>
+              </a:rPr>
+              <a:t> </a:t>
+            </a:r>
+            <a:r>
+              <a:rPr lang="en-US" sz="1600" i="1" dirty="0">
+                <a:solidFill>
+                  <a:prstClr val="black"/>
+                </a:solidFill>
+              </a:rPr>
+              <a:t>et al. </a:t>
+            </a:r>
+            <a:r>
+              <a:rPr lang="en-US" sz="1600" i="1" dirty="0" smtClean="0">
+                <a:solidFill>
+                  <a:prstClr val="black"/>
+                </a:solidFill>
+              </a:rPr>
+              <a:t>2003</a:t>
+            </a:r>
+          </a:p>
+          <a:p>
+            <a:pPr marL="0" indent="0" algn="l" rtl="0">
+              <a:buNone/>
+            </a:pPr>
+            <a:endParaRPr lang="en-US" sz="1600" b="1" dirty="0" smtClean="0">
+              <a:solidFill>
+                <a:prstClr val="black"/>
+              </a:solidFill>
+            </a:endParaRPr>
+          </a:p>
+          <a:p>
+            <a:pPr marL="0" indent="0" algn="l" rtl="0">
+              <a:buNone/>
+            </a:pPr>
+            <a:r>
+              <a:rPr lang="en-US" sz="2000" b="1" dirty="0" smtClean="0">
+                <a:solidFill>
+                  <a:prstClr val="black"/>
+                </a:solidFill>
+              </a:rPr>
+              <a:t>Eukaryote</a:t>
+            </a:r>
+            <a:endParaRPr lang="en-US" sz="2000" b="1" dirty="0">
+              <a:solidFill>
+                <a:prstClr val="black"/>
+              </a:solidFill>
+            </a:endParaRPr>
+          </a:p>
+          <a:p>
+            <a:pPr algn="l" rtl="0"/>
+            <a:r>
+              <a:rPr lang="en-US" sz="1600" i="1" dirty="0" smtClean="0">
+                <a:solidFill>
+                  <a:prstClr val="black"/>
+                </a:solidFill>
+              </a:rPr>
+              <a:t>Chlamydomonas</a:t>
+            </a:r>
+            <a:r>
+              <a:rPr lang="en-US" sz="1600" i="1" dirty="0" smtClean="0"/>
+              <a:t> </a:t>
+            </a:r>
+            <a:r>
+              <a:rPr lang="en-US" sz="1600" i="1" dirty="0" err="1">
+                <a:solidFill>
+                  <a:prstClr val="black"/>
+                </a:solidFill>
+              </a:rPr>
+              <a:t>reinhardtii</a:t>
+            </a:r>
+            <a:r>
+              <a:rPr lang="en-US" sz="1600" i="1" dirty="0"/>
+              <a:t> 	</a:t>
+            </a:r>
+            <a:r>
+              <a:rPr lang="en-US" sz="1600" i="1" dirty="0" smtClean="0"/>
+              <a:t>	</a:t>
+            </a:r>
+            <a:r>
+              <a:rPr lang="en-US" sz="1600" i="1" dirty="0" err="1" smtClean="0">
+                <a:solidFill>
+                  <a:prstClr val="black"/>
+                </a:solidFill>
+              </a:rPr>
+              <a:t>Goho</a:t>
+            </a:r>
+            <a:r>
+              <a:rPr lang="en-US" sz="1600" i="1" dirty="0" smtClean="0">
+                <a:solidFill>
+                  <a:prstClr val="black"/>
+                </a:solidFill>
+              </a:rPr>
+              <a:t> &amp; Bell 2000</a:t>
+            </a:r>
+          </a:p>
+          <a:p>
+            <a:pPr algn="l" rtl="0"/>
+            <a:r>
+              <a:rPr lang="en-US" sz="1600" i="1" dirty="0"/>
+              <a:t>Saccharomyces </a:t>
+            </a:r>
+            <a:r>
+              <a:rPr lang="en-US" sz="1600" i="1" dirty="0" smtClean="0">
+                <a:solidFill>
+                  <a:prstClr val="black"/>
+                </a:solidFill>
+              </a:rPr>
+              <a:t>cerevisiae  </a:t>
+            </a:r>
+            <a:r>
+              <a:rPr lang="en-US" sz="1600" dirty="0" smtClean="0"/>
+              <a:t>		</a:t>
+            </a:r>
+            <a:r>
+              <a:rPr lang="en-US" sz="1600" i="1" dirty="0" smtClean="0">
+                <a:solidFill>
+                  <a:prstClr val="black"/>
+                </a:solidFill>
+              </a:rPr>
+              <a:t>Hall 1992; </a:t>
+            </a:r>
+            <a:r>
+              <a:rPr lang="en-US" sz="1600" i="1" dirty="0" err="1" smtClean="0">
+                <a:solidFill>
+                  <a:prstClr val="black"/>
+                </a:solidFill>
+              </a:rPr>
+              <a:t>Heidenreich</a:t>
+            </a:r>
+            <a:r>
+              <a:rPr lang="en-US" sz="1600" i="1" dirty="0" smtClean="0">
+                <a:solidFill>
+                  <a:prstClr val="black"/>
+                </a:solidFill>
+              </a:rPr>
+              <a:t> 2007</a:t>
+            </a:r>
+          </a:p>
+          <a:p>
+            <a:pPr algn="l" rtl="0"/>
+            <a:r>
+              <a:rPr lang="en-US" sz="1600" i="1" dirty="0" err="1"/>
+              <a:t>Caenorhabditis</a:t>
+            </a:r>
+            <a:r>
+              <a:rPr lang="en-US" sz="1600" i="1" dirty="0"/>
+              <a:t> </a:t>
+            </a:r>
+            <a:r>
+              <a:rPr lang="en-US" sz="1600" i="1" dirty="0" err="1" smtClean="0">
+                <a:solidFill>
+                  <a:prstClr val="black"/>
+                </a:solidFill>
+              </a:rPr>
+              <a:t>elegans</a:t>
+            </a:r>
+            <a:r>
+              <a:rPr lang="en-US" sz="1600" i="1" dirty="0" smtClean="0">
+                <a:solidFill>
+                  <a:prstClr val="black"/>
+                </a:solidFill>
+              </a:rPr>
+              <a:t> &amp; </a:t>
+            </a:r>
+            <a:r>
+              <a:rPr lang="en-US" sz="1600" i="1" dirty="0" err="1" smtClean="0">
+                <a:solidFill>
+                  <a:prstClr val="black"/>
+                </a:solidFill>
+              </a:rPr>
+              <a:t>briggsae</a:t>
+            </a:r>
+            <a:r>
+              <a:rPr lang="en-US" sz="1600" i="1" dirty="0" smtClean="0">
+                <a:solidFill>
+                  <a:prstClr val="black"/>
+                </a:solidFill>
+              </a:rPr>
+              <a:t> 	</a:t>
+            </a:r>
+            <a:r>
+              <a:rPr lang="en-US" sz="1600" i="1" dirty="0" err="1" smtClean="0">
+                <a:solidFill>
+                  <a:prstClr val="black"/>
+                </a:solidFill>
+              </a:rPr>
+              <a:t>Matsuba</a:t>
+            </a:r>
+            <a:r>
+              <a:rPr lang="en-US" sz="1600" i="1" dirty="0" smtClean="0">
+                <a:solidFill>
+                  <a:prstClr val="black"/>
+                </a:solidFill>
+              </a:rPr>
+              <a:t> </a:t>
+            </a:r>
+            <a:r>
+              <a:rPr lang="en-US" sz="1600" i="1" dirty="0">
+                <a:solidFill>
+                  <a:prstClr val="black"/>
+                </a:solidFill>
+              </a:rPr>
+              <a:t>et al. </a:t>
+            </a:r>
+            <a:r>
+              <a:rPr lang="en-US" sz="1600" i="1" dirty="0" smtClean="0">
+                <a:solidFill>
+                  <a:prstClr val="black"/>
+                </a:solidFill>
+              </a:rPr>
+              <a:t>2012</a:t>
+            </a:r>
+            <a:endParaRPr lang="en-US" sz="1600" i="1" dirty="0">
+              <a:solidFill>
+                <a:prstClr val="black"/>
+              </a:solidFill>
+            </a:endParaRPr>
+          </a:p>
+          <a:p>
+            <a:pPr algn="l" rtl="0"/>
+            <a:r>
+              <a:rPr lang="en-US" sz="1600" i="1" dirty="0" smtClean="0">
+                <a:solidFill>
+                  <a:prstClr val="black"/>
+                </a:solidFill>
+              </a:rPr>
+              <a:t>Drosophila </a:t>
+            </a:r>
+            <a:r>
+              <a:rPr lang="en-US" sz="1600" i="1" dirty="0">
+                <a:solidFill>
+                  <a:prstClr val="black"/>
+                </a:solidFill>
+              </a:rPr>
+              <a:t>melanogaster </a:t>
+            </a:r>
+            <a:r>
+              <a:rPr lang="en-US" sz="1600" i="1" dirty="0"/>
+              <a:t>		</a:t>
+            </a:r>
+            <a:r>
+              <a:rPr lang="en-US" sz="1600" i="1" dirty="0" smtClean="0"/>
+              <a:t>Sharp &amp; </a:t>
+            </a:r>
+            <a:r>
+              <a:rPr lang="en-US" sz="1600" i="1" dirty="0" err="1" smtClean="0">
+                <a:solidFill>
+                  <a:prstClr val="black"/>
+                </a:solidFill>
+              </a:rPr>
+              <a:t>Agrawal</a:t>
+            </a:r>
+            <a:r>
+              <a:rPr lang="en-US" sz="1600" i="1" dirty="0" smtClean="0">
+                <a:solidFill>
+                  <a:prstClr val="black"/>
+                </a:solidFill>
+              </a:rPr>
+              <a:t> 2012</a:t>
+            </a:r>
+            <a:endParaRPr lang="en-US" sz="1600" i="1" dirty="0">
+              <a:solidFill>
+                <a:prstClr val="black"/>
+              </a:solidFill>
+            </a:endParaRPr>
+          </a:p>
+          <a:p>
+            <a:pPr algn="l" rtl="0"/>
+            <a:r>
+              <a:rPr lang="en-US" sz="1600" i="1" dirty="0" smtClean="0">
+                <a:solidFill>
+                  <a:prstClr val="black"/>
+                </a:solidFill>
+              </a:rPr>
+              <a:t>Human cancer cells</a:t>
+            </a:r>
+            <a:r>
+              <a:rPr lang="en-US" sz="1600" dirty="0"/>
+              <a:t>		</a:t>
+            </a:r>
+            <a:r>
+              <a:rPr lang="en-US" sz="1600" dirty="0" smtClean="0"/>
+              <a:t>Hara </a:t>
+            </a:r>
+            <a:r>
+              <a:rPr lang="en-US" sz="1600" dirty="0" smtClean="0"/>
+              <a:t>et al. 2005; </a:t>
+            </a:r>
+            <a:r>
+              <a:rPr lang="en-US" sz="1600" i="1" dirty="0" smtClean="0">
+                <a:solidFill>
+                  <a:prstClr val="black"/>
+                </a:solidFill>
+              </a:rPr>
+              <a:t>Bristow &amp; Hill 2008</a:t>
+            </a:r>
+          </a:p>
+          <a:p>
+            <a:pPr marL="0" indent="0" algn="l" rtl="0">
+              <a:buNone/>
+            </a:pPr>
+            <a:endParaRPr lang="en-US" sz="1600" i="1" dirty="0" smtClean="0">
+              <a:solidFill>
+                <a:prstClr val="black"/>
+              </a:solidFill>
+            </a:endParaRPr>
+          </a:p>
+          <a:p>
+            <a:pPr marL="0" indent="0" algn="l" rtl="0">
+              <a:buNone/>
+            </a:pPr>
+            <a:r>
+              <a:rPr lang="en-US" sz="1600" i="1" dirty="0" smtClean="0">
+                <a:solidFill>
+                  <a:prstClr val="black"/>
+                </a:solidFill>
+              </a:rPr>
+              <a:t>Reviewed </a:t>
+            </a:r>
+            <a:r>
+              <a:rPr lang="en-US" sz="1600" i="1" dirty="0">
+                <a:solidFill>
+                  <a:prstClr val="black"/>
+                </a:solidFill>
+              </a:rPr>
+              <a:t>by Foster 2007; </a:t>
+            </a:r>
+            <a:r>
+              <a:rPr lang="en-US" sz="1600" i="1" dirty="0" err="1">
+                <a:solidFill>
+                  <a:prstClr val="black"/>
+                </a:solidFill>
+              </a:rPr>
+              <a:t>Galhardo</a:t>
+            </a:r>
+            <a:r>
+              <a:rPr lang="en-US" sz="1600" i="1" dirty="0">
+                <a:solidFill>
+                  <a:prstClr val="black"/>
+                </a:solidFill>
+              </a:rPr>
+              <a:t> et al. 2007; Rosenberg et al. </a:t>
+            </a:r>
+            <a:r>
+              <a:rPr lang="en-US" sz="1600" i="1" dirty="0" smtClean="0">
+                <a:solidFill>
+                  <a:prstClr val="black"/>
+                </a:solidFill>
+              </a:rPr>
+              <a:t>2012; Poole 2012</a:t>
+            </a:r>
+            <a:endParaRPr lang="he-IL" sz="1600" i="1" dirty="0">
+              <a:solidFill>
+                <a:prstClr val="black"/>
+              </a:solidFill>
+            </a:endParaRPr>
+          </a:p>
+        </p:txBody>
+      </p:sp>
+      <p:sp>
+        <p:nvSpPr>
+          <p:cNvPr id="6" name="Slide Number Placeholder 5"/>
+          <p:cNvSpPr>
+            <a:spLocks noGrp="1"/>
+          </p:cNvSpPr>
+          <p:nvPr>
+            <p:ph type="sldNum" sz="quarter" idx="12"/>
+          </p:nvPr>
+        </p:nvSpPr>
+        <p:spPr/>
+        <p:txBody>
+          <a:bodyPr/>
+          <a:lstStyle/>
+          <a:p>
+            <a:pPr algn="r"/>
+            <a:fld id="{22D68BCF-14A6-43A9-AA70-BAEC11B3F76D}" type="slidenum">
+              <a:rPr lang="en-US" smtClean="0"/>
+              <a:pPr algn="r"/>
+              <a:t>7</a:t>
+            </a:fld>
+            <a:endParaRPr lang="en-US" dirty="0"/>
+          </a:p>
+        </p:txBody>
+      </p:sp>
+      <p:sp>
+        <p:nvSpPr>
+          <p:cNvPr id="5" name="Date Placeholder 4"/>
+          <p:cNvSpPr>
+            <a:spLocks noGrp="1"/>
+          </p:cNvSpPr>
+          <p:nvPr>
+            <p:ph type="dt" sz="half" idx="10"/>
+          </p:nvPr>
+        </p:nvSpPr>
+        <p:spPr/>
+        <p:txBody>
+          <a:bodyPr/>
+          <a:lstStyle/>
+          <a:p>
+            <a:r>
+              <a:rPr lang="en-US" dirty="0" smtClean="0"/>
+              <a:t>SIDEER 2013</a:t>
+            </a:r>
+            <a:endParaRPr lang="en-US" dirty="0"/>
+          </a:p>
+        </p:txBody>
+      </p:sp>
+      <p:sp>
+        <p:nvSpPr>
+          <p:cNvPr id="9" name="Footer Placeholder 8"/>
+          <p:cNvSpPr>
+            <a:spLocks noGrp="1"/>
+          </p:cNvSpPr>
+          <p:nvPr>
+            <p:ph type="ftr" sz="quarter" idx="11"/>
+          </p:nvPr>
+        </p:nvSpPr>
+        <p:spPr/>
+        <p:txBody>
+          <a:bodyPr/>
+          <a:lstStyle/>
+          <a:p>
+            <a:pPr algn="l" rtl="0"/>
+            <a:r>
+              <a:rPr lang="en-US" dirty="0" err="1" smtClean="0"/>
+              <a:t>Yoav</a:t>
+            </a:r>
+            <a:r>
+              <a:rPr lang="en-US" dirty="0" smtClean="0"/>
+              <a:t> Ram</a:t>
+            </a:r>
+            <a:endParaRPr lang="en-US" dirty="0"/>
+          </a:p>
+        </p:txBody>
+      </p:sp>
+      <p:pic>
+        <p:nvPicPr>
+          <p:cNvPr id="10" name="Picture 5" descr="D:\My Documents\yoavram\sim\presentation\Chlamydomonas_(10000x).jpg"/>
+          <p:cNvPicPr>
+            <a:picLocks noChangeAspect="1" noChangeArrowheads="1"/>
+          </p:cNvPicPr>
+          <p:nvPr/>
+        </p:nvPicPr>
+        <p:blipFill rotWithShape="1">
+          <a:blip r:embed="rId3" cstate="print">
+            <a:extLst>
+              <a:ext uri="{28A0092B-C50C-407E-A947-70E740481C1C}">
+                <a14:useLocalDpi xmlns:a14="http://schemas.microsoft.com/office/drawing/2010/main" val="0"/>
+              </a:ext>
+            </a:extLst>
+          </a:blip>
+          <a:srcRect b="4613"/>
+          <a:stretch/>
+        </p:blipFill>
+        <p:spPr bwMode="auto">
+          <a:xfrm>
+            <a:off x="6804462" y="454379"/>
+            <a:ext cx="2160000" cy="2110664"/>
+          </a:xfrm>
+          <a:prstGeom prst="rect">
+            <a:avLst/>
+          </a:prstGeom>
+          <a:ln>
+            <a:noFill/>
+          </a:ln>
+          <a:effectLst>
+            <a:outerShdw blurRad="50800" dist="38100" dir="2700000" algn="tl" rotWithShape="0">
+              <a:prstClr val="black">
+                <a:alpha val="40000"/>
+              </a:prstClr>
+            </a:outerShdw>
+          </a:effectLst>
+          <a:extLst>
+            <a:ext uri="{909E8E84-426E-40DD-AFC4-6F175D3DCCD1}">
+              <a14:hiddenFill xmlns:a14="http://schemas.microsoft.com/office/drawing/2010/main">
+                <a:solidFill>
+                  <a:srgbClr val="FFFFFF"/>
+                </a:solidFill>
+              </a14:hiddenFill>
+            </a:ext>
+          </a:extLst>
+        </p:spPr>
+      </p:pic>
+      <p:sp>
+        <p:nvSpPr>
+          <p:cNvPr id="11" name="Rectangle 10"/>
+          <p:cNvSpPr/>
+          <p:nvPr/>
+        </p:nvSpPr>
+        <p:spPr>
+          <a:xfrm>
+            <a:off x="6870186" y="404664"/>
+            <a:ext cx="1446230" cy="369332"/>
+          </a:xfrm>
+          <a:prstGeom prst="rect">
+            <a:avLst/>
+          </a:prstGeom>
+        </p:spPr>
+        <p:txBody>
+          <a:bodyPr wrap="none">
+            <a:spAutoFit/>
+          </a:bodyPr>
+          <a:lstStyle/>
+          <a:p>
+            <a:r>
+              <a:rPr lang="en-US" i="1" dirty="0" smtClean="0">
+                <a:solidFill>
+                  <a:schemeClr val="bg1"/>
+                </a:solidFill>
+                <a:effectLst>
+                  <a:outerShdw blurRad="38100" dist="38100" dir="2700000" algn="tl">
+                    <a:srgbClr val="000000">
+                      <a:alpha val="43137"/>
+                    </a:srgbClr>
+                  </a:outerShdw>
+                </a:effectLst>
+              </a:rPr>
+              <a:t>C. </a:t>
+            </a:r>
+            <a:r>
+              <a:rPr lang="en-US" i="1" dirty="0" err="1">
+                <a:solidFill>
+                  <a:schemeClr val="bg1"/>
+                </a:solidFill>
+                <a:effectLst>
+                  <a:outerShdw blurRad="38100" dist="38100" dir="2700000" algn="tl">
+                    <a:srgbClr val="000000">
+                      <a:alpha val="43137"/>
+                    </a:srgbClr>
+                  </a:outerShdw>
+                </a:effectLst>
+              </a:rPr>
+              <a:t>reinhardtii</a:t>
+            </a:r>
+            <a:r>
+              <a:rPr lang="en-US" i="1" dirty="0">
+                <a:solidFill>
+                  <a:schemeClr val="bg1"/>
+                </a:solidFill>
+                <a:effectLst>
+                  <a:outerShdw blurRad="38100" dist="38100" dir="2700000" algn="tl">
+                    <a:srgbClr val="000000">
+                      <a:alpha val="43137"/>
+                    </a:srgbClr>
+                  </a:outerShdw>
+                </a:effectLst>
+              </a:rPr>
+              <a:t> </a:t>
+            </a:r>
+            <a:endParaRPr lang="he-IL" dirty="0">
+              <a:solidFill>
+                <a:schemeClr val="bg1"/>
+              </a:solidFill>
+              <a:effectLst>
+                <a:outerShdw blurRad="38100" dist="38100" dir="2700000" algn="tl">
+                  <a:srgbClr val="000000">
+                    <a:alpha val="43137"/>
+                  </a:srgbClr>
+                </a:outerShdw>
+              </a:effectLst>
+            </a:endParaRPr>
+          </a:p>
+        </p:txBody>
+      </p:sp>
+      <p:sp>
+        <p:nvSpPr>
+          <p:cNvPr id="12" name="Title 1"/>
+          <p:cNvSpPr txBox="1">
+            <a:spLocks/>
+          </p:cNvSpPr>
+          <p:nvPr/>
+        </p:nvSpPr>
+        <p:spPr>
+          <a:xfrm>
+            <a:off x="457200" y="413792"/>
+            <a:ext cx="8229600" cy="1143000"/>
+          </a:xfrm>
+          <a:prstGeom prst="rect">
+            <a:avLst/>
+          </a:prstGeom>
+        </p:spPr>
+        <p:txBody>
+          <a:bodyPr vert="horz" lIns="91440" tIns="45720" rIns="91440" bIns="45720" rtlCol="0" anchor="ctr">
+            <a:normAutofit/>
+          </a:bodyPr>
+          <a:lstStyle>
+            <a:lvl1pPr algn="ctr" defTabSz="914400" rtl="0" eaLnBrk="1" latinLnBrk="0" hangingPunct="1">
+              <a:spcBef>
+                <a:spcPct val="0"/>
+              </a:spcBef>
+              <a:buNone/>
+              <a:defRPr sz="4400" kern="1200">
+                <a:solidFill>
+                  <a:schemeClr val="tx1"/>
+                </a:solidFill>
+                <a:latin typeface="+mj-lt"/>
+                <a:ea typeface="+mj-ea"/>
+                <a:cs typeface="+mj-cs"/>
+              </a:defRPr>
+            </a:lvl1pPr>
+          </a:lstStyle>
+          <a:p>
+            <a:pPr algn="l"/>
+            <a:r>
+              <a:rPr lang="en-US" sz="4000" spc="-100" dirty="0">
+                <a:solidFill>
+                  <a:schemeClr val="tx2"/>
+                </a:solidFill>
+              </a:rPr>
+              <a:t>Evidence</a:t>
+            </a:r>
+            <a:endParaRPr lang="he-IL" sz="4000" spc="-100" dirty="0">
+              <a:solidFill>
+                <a:schemeClr val="tx2"/>
+              </a:solidFill>
+            </a:endParaRPr>
+          </a:p>
+        </p:txBody>
+      </p:sp>
+      <p:pic>
+        <p:nvPicPr>
+          <p:cNvPr id="13" name="Picture 4" descr="D:\My Documents\yoavram\sim\presentation\Bacillus_subtilis.jpg"/>
+          <p:cNvPicPr>
+            <a:picLocks noChangeAspect="1" noChangeArrowheads="1"/>
+          </p:cNvPicPr>
+          <p:nvPr/>
+        </p:nvPicPr>
+        <p:blipFill>
+          <a:blip r:embed="rId4" cstate="print">
+            <a:extLst>
+              <a:ext uri="{28A0092B-C50C-407E-A947-70E740481C1C}">
+                <a14:useLocalDpi xmlns:a14="http://schemas.microsoft.com/office/drawing/2010/main" val="0"/>
+              </a:ext>
+            </a:extLst>
+          </a:blip>
+          <a:srcRect/>
+          <a:stretch>
+            <a:fillRect/>
+          </a:stretch>
+        </p:blipFill>
+        <p:spPr bwMode="auto">
+          <a:xfrm>
+            <a:off x="6786206" y="2852936"/>
+            <a:ext cx="2160000" cy="1620000"/>
+          </a:xfrm>
+          <a:prstGeom prst="rect">
+            <a:avLst/>
+          </a:prstGeom>
+          <a:ln>
+            <a:noFill/>
+          </a:ln>
+          <a:effectLst>
+            <a:outerShdw blurRad="50800" dist="38100" dir="2700000" algn="tl" rotWithShape="0">
+              <a:prstClr val="black">
+                <a:alpha val="40000"/>
+              </a:prstClr>
+            </a:outerShdw>
+          </a:effectLst>
+          <a:extLst>
+            <a:ext uri="{909E8E84-426E-40DD-AFC4-6F175D3DCCD1}">
+              <a14:hiddenFill xmlns:a14="http://schemas.microsoft.com/office/drawing/2010/main">
+                <a:solidFill>
+                  <a:srgbClr val="FFFFFF"/>
+                </a:solidFill>
+              </a14:hiddenFill>
+            </a:ext>
+          </a:extLst>
+        </p:spPr>
+      </p:pic>
+      <p:sp>
+        <p:nvSpPr>
+          <p:cNvPr id="14" name="Rectangle 13"/>
+          <p:cNvSpPr/>
+          <p:nvPr/>
+        </p:nvSpPr>
+        <p:spPr>
+          <a:xfrm>
+            <a:off x="6784260" y="4139788"/>
+            <a:ext cx="1172116" cy="369332"/>
+          </a:xfrm>
+          <a:prstGeom prst="rect">
+            <a:avLst/>
+          </a:prstGeom>
+        </p:spPr>
+        <p:txBody>
+          <a:bodyPr wrap="none">
+            <a:spAutoFit/>
+          </a:bodyPr>
+          <a:lstStyle/>
+          <a:p>
+            <a:r>
+              <a:rPr lang="en-US" i="1" dirty="0" smtClean="0"/>
+              <a:t>B. </a:t>
+            </a:r>
+            <a:r>
+              <a:rPr lang="en-US" i="1" dirty="0" err="1" smtClean="0"/>
+              <a:t>subtilis</a:t>
+            </a:r>
+            <a:endParaRPr lang="he-IL" dirty="0"/>
+          </a:p>
+        </p:txBody>
+      </p:sp>
+    </p:spTree>
+    <p:extLst>
+      <p:ext uri="{BB962C8B-B14F-4D97-AF65-F5344CB8AC3E}">
+        <p14:creationId xmlns:p14="http://schemas.microsoft.com/office/powerpoint/2010/main" val="1919552525"/>
+      </p:ext>
+    </p:extLst>
+  </p:cSld>
+  <p:clrMapOvr>
+    <a:masterClrMapping/>
+  </p:clrMapOvr>
+  <mc:AlternateContent xmlns:mc="http://schemas.openxmlformats.org/markup-compatibility/2006" xmlns:p14="http://schemas.microsoft.com/office/powerpoint/2010/main">
+    <mc:Choice Requires="p14">
+      <p:transition spd="slow" p14:dur="2000" advTm="21123"/>
+    </mc:Choice>
+    <mc:Fallback xmlns="">
+      <p:transition spd="slow" advTm="21123"/>
+    </mc:Fallback>
+  </mc:AlternateContent>
+  <p:timing>
+    <p:tnLst>
+      <p:par>
+        <p:cTn id="1" dur="indefinite" restart="never" nodeType="tmRoot"/>
+      </p:par>
+    </p:tnLst>
+  </p:timing>
+</p:sld>
+</file>
+
+<file path=ppt/slides/slide8.xml><?xml version="1.0" encoding="utf-8"?>
+<p:sld xmlns:a="http://schemas.openxmlformats.org/drawingml/2006/main" xmlns:r="http://schemas.openxmlformats.org/officeDocument/2006/relationships" xmlns:p="http://schemas.openxmlformats.org/presentationml/2006/main">
+  <p:cSld>
+    <p:spTree>
+      <p:nvGrpSpPr>
+        <p:cNvPr id="1" name=""/>
+        <p:cNvGrpSpPr/>
+        <p:nvPr/>
+      </p:nvGrpSpPr>
+      <p:grpSpPr>
+        <a:xfrm>
+          <a:off x="0" y="0"/>
+          <a:ext cx="0" cy="0"/>
+          <a:chOff x="0" y="0"/>
+          <a:chExt cx="0" cy="0"/>
+        </a:xfrm>
+      </p:grpSpPr>
+      <p:sp>
+        <p:nvSpPr>
+          <p:cNvPr id="2" name="Title 1"/>
+          <p:cNvSpPr>
+            <a:spLocks noGrp="1"/>
+          </p:cNvSpPr>
+          <p:nvPr>
+            <p:ph type="title"/>
+          </p:nvPr>
+        </p:nvSpPr>
+        <p:spPr/>
+        <p:txBody>
+          <a:bodyPr/>
+          <a:lstStyle/>
+          <a:p>
+            <a:pPr rtl="0"/>
+            <a:r>
+              <a:rPr lang="en-US" dirty="0" smtClean="0"/>
+              <a:t>Evolution of Stress-Induced Mutation</a:t>
+            </a:r>
+            <a:endParaRPr lang="he-IL" dirty="0"/>
+          </a:p>
+        </p:txBody>
+      </p:sp>
+      <p:sp>
+        <p:nvSpPr>
+          <p:cNvPr id="3" name="Content Placeholder 2"/>
+          <p:cNvSpPr>
+            <a:spLocks noGrp="1"/>
+          </p:cNvSpPr>
+          <p:nvPr>
+            <p:ph idx="1"/>
+          </p:nvPr>
+        </p:nvSpPr>
+        <p:spPr>
+          <a:xfrm>
+            <a:off x="457200" y="1600200"/>
+            <a:ext cx="8389220" cy="2260848"/>
+          </a:xfrm>
+        </p:spPr>
+        <p:txBody>
+          <a:bodyPr>
+            <a:noAutofit/>
+          </a:bodyPr>
+          <a:lstStyle/>
+          <a:p>
+            <a:pPr algn="l" rtl="0"/>
+            <a:r>
+              <a:rPr lang="en-US" sz="2800" dirty="0" smtClean="0">
+                <a:solidFill>
+                  <a:schemeClr val="tx2"/>
+                </a:solidFill>
+              </a:rPr>
+              <a:t>Null Hypothesis</a:t>
+            </a:r>
+            <a:r>
+              <a:rPr lang="en-US" sz="2800" dirty="0" smtClean="0"/>
+              <a:t>: mutation is a by-product of stress</a:t>
+            </a:r>
+          </a:p>
+          <a:p>
+            <a:pPr algn="l" rtl="0"/>
+            <a:r>
+              <a:rPr lang="en-US" sz="2800" dirty="0" smtClean="0"/>
+              <a:t>Alternative, </a:t>
+            </a:r>
+            <a:r>
+              <a:rPr lang="en-US" sz="2800" dirty="0" smtClean="0">
+                <a:solidFill>
+                  <a:schemeClr val="tx2"/>
+                </a:solidFill>
+              </a:rPr>
+              <a:t>non-adaptive hypotheses</a:t>
+            </a:r>
+            <a:r>
+              <a:rPr lang="en-US" sz="2800" dirty="0" smtClean="0"/>
+              <a:t>:</a:t>
+            </a:r>
+          </a:p>
+          <a:p>
+            <a:pPr lvl="1" algn="l" rtl="0"/>
+            <a:r>
+              <a:rPr lang="en-US" sz="2400" dirty="0" smtClean="0"/>
+              <a:t>Cost of DNA replication fidelity (</a:t>
+            </a:r>
+            <a:r>
+              <a:rPr lang="en-US" sz="2400" i="1" dirty="0" smtClean="0"/>
+              <a:t>Dawson 1998</a:t>
+            </a:r>
+            <a:r>
+              <a:rPr lang="en-US" sz="2400" dirty="0" smtClean="0"/>
+              <a:t>)</a:t>
+            </a:r>
+          </a:p>
+          <a:p>
+            <a:pPr lvl="1" algn="l" rtl="0"/>
+            <a:r>
+              <a:rPr lang="en-US" sz="2400" dirty="0" smtClean="0"/>
+              <a:t>Drift barrier hypothesis (</a:t>
+            </a:r>
+            <a:r>
+              <a:rPr lang="en-US" sz="2400" i="1" dirty="0" smtClean="0"/>
+              <a:t>Lynch 2010, 2011)</a:t>
+            </a:r>
+            <a:endParaRPr lang="he-IL" sz="2400" b="1" dirty="0"/>
+          </a:p>
+        </p:txBody>
+      </p:sp>
+      <p:sp>
+        <p:nvSpPr>
+          <p:cNvPr id="4" name="Date Placeholder 3"/>
+          <p:cNvSpPr>
+            <a:spLocks noGrp="1"/>
+          </p:cNvSpPr>
+          <p:nvPr>
+            <p:ph type="dt" sz="half" idx="10"/>
+          </p:nvPr>
+        </p:nvSpPr>
+        <p:spPr/>
+        <p:txBody>
+          <a:bodyPr/>
+          <a:lstStyle/>
+          <a:p>
+            <a:pPr rtl="0"/>
+            <a:r>
+              <a:rPr lang="he-IL" dirty="0" smtClean="0"/>
+              <a:t>SIDEER 2013</a:t>
+            </a:r>
+            <a:endParaRPr lang="he-IL" dirty="0"/>
+          </a:p>
+        </p:txBody>
+      </p:sp>
+      <p:sp>
+        <p:nvSpPr>
+          <p:cNvPr id="5" name="Footer Placeholder 4"/>
+          <p:cNvSpPr>
+            <a:spLocks noGrp="1"/>
+          </p:cNvSpPr>
+          <p:nvPr>
+            <p:ph type="ftr" sz="quarter" idx="11"/>
+          </p:nvPr>
+        </p:nvSpPr>
+        <p:spPr/>
+        <p:txBody>
+          <a:bodyPr/>
+          <a:lstStyle/>
+          <a:p>
+            <a:pPr algn="l"/>
+            <a:r>
+              <a:rPr lang="en-US" dirty="0" err="1" smtClean="0"/>
+              <a:t>Yoav</a:t>
+            </a:r>
+            <a:r>
+              <a:rPr lang="en-US" dirty="0" smtClean="0"/>
+              <a:t> Ram</a:t>
+            </a:r>
+            <a:endParaRPr lang="he-IL" dirty="0"/>
+          </a:p>
+        </p:txBody>
+      </p:sp>
+      <p:sp>
+        <p:nvSpPr>
+          <p:cNvPr id="6" name="Slide Number Placeholder 5"/>
+          <p:cNvSpPr>
+            <a:spLocks noGrp="1"/>
+          </p:cNvSpPr>
+          <p:nvPr>
+            <p:ph type="sldNum" sz="quarter" idx="12"/>
+          </p:nvPr>
+        </p:nvSpPr>
+        <p:spPr/>
+        <p:txBody>
+          <a:bodyPr/>
+          <a:lstStyle/>
+          <a:p>
+            <a:pPr algn="r"/>
+            <a:fld id="{DDDA39DD-F56F-4D5B-9830-607597A41E0F}" type="slidenum">
+              <a:rPr lang="he-IL" smtClean="0"/>
+              <a:pPr algn="r"/>
+              <a:t>8</a:t>
+            </a:fld>
+            <a:endParaRPr lang="he-IL" dirty="0"/>
+          </a:p>
+        </p:txBody>
+      </p:sp>
+      <p:pic>
+        <p:nvPicPr>
+          <p:cNvPr id="6146" name="Picture 2" descr="D:\projects\sim\simlogo.png"/>
+          <p:cNvPicPr>
+            <a:picLocks noChangeAspect="1" noChangeArrowheads="1"/>
+          </p:cNvPicPr>
+          <p:nvPr/>
+        </p:nvPicPr>
+        <p:blipFill>
+          <a:blip r:embed="rId2">
+            <a:extLst>
+              <a:ext uri="{28A0092B-C50C-407E-A947-70E740481C1C}">
+                <a14:useLocalDpi xmlns:a14="http://schemas.microsoft.com/office/drawing/2010/main" val="0"/>
+              </a:ext>
+            </a:extLst>
+          </a:blip>
+          <a:srcRect/>
+          <a:stretch>
+            <a:fillRect/>
+          </a:stretch>
+        </p:blipFill>
+        <p:spPr bwMode="auto">
+          <a:xfrm>
+            <a:off x="6001975" y="4005064"/>
+            <a:ext cx="2844445" cy="2552381"/>
+          </a:xfrm>
+          <a:prstGeom prst="rect">
+            <a:avLst/>
+          </a:prstGeom>
+          <a:noFill/>
+          <a:extLst>
+            <a:ext uri="{909E8E84-426E-40DD-AFC4-6F175D3DCCD1}">
+              <a14:hiddenFill xmlns:a14="http://schemas.microsoft.com/office/drawing/2010/main">
+                <a:solidFill>
+                  <a:srgbClr val="FFFFFF"/>
+                </a:solidFill>
+              </a14:hiddenFill>
+            </a:ext>
+          </a:extLst>
+        </p:spPr>
+      </p:pic>
+      <p:sp>
+        <p:nvSpPr>
+          <p:cNvPr id="9" name="Content Placeholder 2"/>
+          <p:cNvSpPr txBox="1">
+            <a:spLocks/>
+          </p:cNvSpPr>
+          <p:nvPr/>
+        </p:nvSpPr>
+        <p:spPr>
+          <a:xfrm>
+            <a:off x="446856" y="3942928"/>
+            <a:ext cx="5349280" cy="2582416"/>
+          </a:xfrm>
+          <a:prstGeom prst="rect">
+            <a:avLst/>
+          </a:prstGeom>
+        </p:spPr>
+        <p:txBody>
+          <a:bodyPr vert="horz" lIns="91440" tIns="45720" rIns="91440" bIns="45720" rtlCol="0">
+            <a:noAutofit/>
+          </a:bodyPr>
+          <a:lstStyle>
+            <a:lvl1pPr marL="182880" indent="-182880" algn="r" defTabSz="914400" rtl="1" eaLnBrk="1" latinLnBrk="0" hangingPunct="1">
+              <a:spcBef>
+                <a:spcPct val="20000"/>
+              </a:spcBef>
+              <a:buClr>
+                <a:schemeClr val="accent1"/>
+              </a:buClr>
+              <a:buSzPct val="85000"/>
+              <a:buFont typeface="Arial" pitchFamily="34" charset="0"/>
+              <a:buChar char="•"/>
+              <a:defRPr sz="2400" kern="1200">
+                <a:solidFill>
+                  <a:schemeClr val="tx1"/>
+                </a:solidFill>
+                <a:latin typeface="+mn-lt"/>
+                <a:ea typeface="+mn-ea"/>
+                <a:cs typeface="+mn-cs"/>
+              </a:defRPr>
+            </a:lvl1pPr>
+            <a:lvl2pPr marL="457200" indent="-182880" algn="r" defTabSz="914400" rtl="1" eaLnBrk="1" latinLnBrk="0" hangingPunct="1">
+              <a:spcBef>
+                <a:spcPct val="20000"/>
+              </a:spcBef>
+              <a:buClr>
+                <a:schemeClr val="accent1"/>
+              </a:buClr>
+              <a:buSzPct val="85000"/>
+              <a:buFont typeface="Arial" pitchFamily="34" charset="0"/>
+              <a:buChar char="•"/>
+              <a:defRPr sz="2000" kern="1200">
+                <a:solidFill>
+                  <a:schemeClr val="tx1"/>
+                </a:solidFill>
+                <a:latin typeface="+mn-lt"/>
+                <a:ea typeface="+mn-ea"/>
+                <a:cs typeface="+mn-cs"/>
+              </a:defRPr>
+            </a:lvl2pPr>
+            <a:lvl3pPr marL="731520" indent="-182880" algn="r" defTabSz="914400" rtl="1" eaLnBrk="1" latinLnBrk="0" hangingPunct="1">
+              <a:spcBef>
+                <a:spcPct val="20000"/>
+              </a:spcBef>
+              <a:buClr>
+                <a:schemeClr val="accent1"/>
+              </a:buClr>
+              <a:buSzPct val="90000"/>
+              <a:buFont typeface="Arial" pitchFamily="34" charset="0"/>
+              <a:buChar char="•"/>
+              <a:defRPr sz="1800" kern="1200">
+                <a:solidFill>
+                  <a:schemeClr val="tx1"/>
+                </a:solidFill>
+                <a:latin typeface="+mn-lt"/>
+                <a:ea typeface="+mn-ea"/>
+                <a:cs typeface="+mn-cs"/>
+              </a:defRPr>
+            </a:lvl3pPr>
+            <a:lvl4pPr marL="1005840" indent="-182880" algn="r" defTabSz="914400" rtl="1" eaLnBrk="1" latinLnBrk="0" hangingPunct="1">
+              <a:spcBef>
+                <a:spcPct val="20000"/>
+              </a:spcBef>
+              <a:buClr>
+                <a:schemeClr val="accent1"/>
+              </a:buClr>
+              <a:buFont typeface="Arial" pitchFamily="34" charset="0"/>
+              <a:buChar char="•"/>
+              <a:defRPr sz="1600" kern="1200">
+                <a:solidFill>
+                  <a:schemeClr val="tx1"/>
+                </a:solidFill>
+                <a:latin typeface="+mn-lt"/>
+                <a:ea typeface="+mn-ea"/>
+                <a:cs typeface="+mn-cs"/>
+              </a:defRPr>
+            </a:lvl4pPr>
+            <a:lvl5pPr marL="1188720" indent="-137160" algn="r" defTabSz="914400" rtl="1" eaLnBrk="1" latinLnBrk="0" hangingPunct="1">
+              <a:spcBef>
+                <a:spcPct val="20000"/>
+              </a:spcBef>
+              <a:buClr>
+                <a:schemeClr val="accent1"/>
+              </a:buClr>
+              <a:buSzPct val="100000"/>
+              <a:buFont typeface="Arial" pitchFamily="34" charset="0"/>
+              <a:buChar char="•"/>
+              <a:defRPr sz="1400" kern="1200" baseline="0">
+                <a:solidFill>
+                  <a:schemeClr val="tx1"/>
+                </a:solidFill>
+                <a:latin typeface="+mn-lt"/>
+                <a:ea typeface="+mn-ea"/>
+                <a:cs typeface="+mn-cs"/>
+              </a:defRPr>
+            </a:lvl5pPr>
+            <a:lvl6pPr marL="1371600" indent="-182880" algn="r" defTabSz="914400" rtl="1" eaLnBrk="1" latinLnBrk="0" hangingPunct="1">
+              <a:spcBef>
+                <a:spcPct val="20000"/>
+              </a:spcBef>
+              <a:buClr>
+                <a:schemeClr val="accent1"/>
+              </a:buClr>
+              <a:buFont typeface="Arial" pitchFamily="34" charset="0"/>
+              <a:buChar char="•"/>
+              <a:defRPr sz="1300" kern="1200">
+                <a:solidFill>
+                  <a:schemeClr val="tx1"/>
+                </a:solidFill>
+                <a:latin typeface="+mn-lt"/>
+                <a:ea typeface="+mn-ea"/>
+                <a:cs typeface="+mn-cs"/>
+              </a:defRPr>
+            </a:lvl6pPr>
+            <a:lvl7pPr marL="1554480" indent="-182880" algn="r" defTabSz="914400" rtl="1" eaLnBrk="1" latinLnBrk="0" hangingPunct="1">
+              <a:spcBef>
+                <a:spcPct val="20000"/>
+              </a:spcBef>
+              <a:buClr>
+                <a:schemeClr val="accent1"/>
+              </a:buClr>
+              <a:buFont typeface="Arial" pitchFamily="34" charset="0"/>
+              <a:buChar char="•"/>
+              <a:defRPr sz="1300" kern="1200">
+                <a:solidFill>
+                  <a:schemeClr val="tx1"/>
+                </a:solidFill>
+                <a:latin typeface="+mn-lt"/>
+                <a:ea typeface="+mn-ea"/>
+                <a:cs typeface="+mn-cs"/>
+              </a:defRPr>
+            </a:lvl7pPr>
+            <a:lvl8pPr marL="1737360" indent="-182880" algn="r" defTabSz="914400" rtl="1" eaLnBrk="1" latinLnBrk="0" hangingPunct="1">
+              <a:spcBef>
+                <a:spcPct val="20000"/>
+              </a:spcBef>
+              <a:buClr>
+                <a:schemeClr val="accent1"/>
+              </a:buClr>
+              <a:buFont typeface="Arial" pitchFamily="34" charset="0"/>
+              <a:buChar char="•"/>
+              <a:defRPr sz="1300" kern="1200">
+                <a:solidFill>
+                  <a:schemeClr val="tx1"/>
+                </a:solidFill>
+                <a:latin typeface="+mn-lt"/>
+                <a:ea typeface="+mn-ea"/>
+                <a:cs typeface="+mn-cs"/>
+              </a:defRPr>
+            </a:lvl8pPr>
+            <a:lvl9pPr marL="1920240" indent="-182880" algn="r" defTabSz="914400" rtl="1" eaLnBrk="1" latinLnBrk="0" hangingPunct="1">
+              <a:spcBef>
+                <a:spcPct val="20000"/>
+              </a:spcBef>
+              <a:buClr>
+                <a:schemeClr val="accent1"/>
+              </a:buClr>
+              <a:buFont typeface="Arial" pitchFamily="34" charset="0"/>
+              <a:buChar char="•"/>
+              <a:defRPr sz="1300" kern="1200">
+                <a:solidFill>
+                  <a:schemeClr val="tx1"/>
+                </a:solidFill>
+                <a:latin typeface="+mn-lt"/>
+                <a:ea typeface="+mn-ea"/>
+                <a:cs typeface="+mn-cs"/>
+              </a:defRPr>
+            </a:lvl9pPr>
+          </a:lstStyle>
+          <a:p>
+            <a:pPr algn="l" rtl="0"/>
+            <a:r>
+              <a:rPr lang="en-US" sz="2800" dirty="0" smtClean="0">
+                <a:solidFill>
+                  <a:schemeClr val="tx2"/>
+                </a:solidFill>
+              </a:rPr>
+              <a:t>Adaptive hypothesis</a:t>
+            </a:r>
+            <a:r>
+              <a:rPr lang="en-US" sz="2800" dirty="0" smtClean="0"/>
+              <a:t>:</a:t>
+            </a:r>
+          </a:p>
+          <a:p>
+            <a:pPr lvl="1" algn="l" rtl="0"/>
+            <a:r>
+              <a:rPr lang="en-US" sz="2400" b="1" dirty="0" smtClean="0"/>
+              <a:t>“…the evolutionary consequence of SIM is that bacteria are able to adapt rapidly to stressful environments…” </a:t>
+            </a:r>
+          </a:p>
+          <a:p>
+            <a:pPr marL="274320" lvl="1" indent="0" algn="l" rtl="0">
+              <a:buNone/>
+            </a:pPr>
+            <a:r>
+              <a:rPr lang="en-US" sz="2400" b="1" i="1" dirty="0" smtClean="0"/>
+              <a:t>			</a:t>
+            </a:r>
+            <a:r>
+              <a:rPr lang="en-US" i="1" dirty="0" smtClean="0"/>
+              <a:t>MacLean </a:t>
+            </a:r>
+            <a:r>
+              <a:rPr lang="en-US" i="1" dirty="0"/>
+              <a:t>et al. 2013</a:t>
+            </a:r>
+            <a:endParaRPr lang="he-IL" b="1" dirty="0"/>
+          </a:p>
+        </p:txBody>
+      </p:sp>
+    </p:spTree>
+    <p:extLst>
+      <p:ext uri="{BB962C8B-B14F-4D97-AF65-F5344CB8AC3E}">
+        <p14:creationId xmlns:p14="http://schemas.microsoft.com/office/powerpoint/2010/main" val="1330985537"/>
+      </p:ext>
+    </p:extLst>
+  </p:cSld>
+  <p:clrMapOvr>
+    <a:masterClrMapping/>
+  </p:clrMapOvr>
+  <p:timing>
+    <p:tnLst>
+      <p:par>
+        <p:cTn id="1" dur="indefinite" restart="never" nodeType="tmRoot"/>
+      </p:par>
+    </p:tnLst>
+  </p:timing>
+</p:sld>
+</file>
+
+<file path=ppt/slides/slide9.xml><?xml version="1.0" encoding="utf-8"?>
+<p:sld xmlns:a="http://schemas.openxmlformats.org/drawingml/2006/main" xmlns:r="http://schemas.openxmlformats.org/officeDocument/2006/relationships" xmlns:p="http://schemas.openxmlformats.org/presentationml/2006/main">
+  <p:cSld>
+    <p:spTree>
+      <p:nvGrpSpPr>
+        <p:cNvPr id="1" name=""/>
+        <p:cNvGrpSpPr/>
+        <p:nvPr/>
+      </p:nvGrpSpPr>
+      <p:grpSpPr>
+        <a:xfrm>
+          <a:off x="0" y="0"/>
+          <a:ext cx="0" cy="0"/>
+          <a:chOff x="0" y="0"/>
+          <a:chExt cx="0" cy="0"/>
+        </a:xfrm>
+      </p:grpSpPr>
+      <p:sp>
+        <p:nvSpPr>
+          <p:cNvPr id="2" name="Title 1"/>
+          <p:cNvSpPr>
+            <a:spLocks noGrp="1"/>
+          </p:cNvSpPr>
+          <p:nvPr>
+            <p:ph type="title"/>
+          </p:nvPr>
+        </p:nvSpPr>
+        <p:spPr/>
+        <p:txBody>
+          <a:bodyPr/>
+          <a:lstStyle/>
+          <a:p>
+            <a:pPr rtl="0"/>
+            <a:r>
+              <a:rPr lang="en-US" dirty="0" smtClean="0"/>
+              <a:t>Evolution of Stress-Induced Mutation</a:t>
+            </a:r>
+            <a:endParaRPr lang="he-IL" dirty="0"/>
+          </a:p>
+        </p:txBody>
+      </p:sp>
+      <p:sp>
+        <p:nvSpPr>
+          <p:cNvPr id="13" name="Text Placeholder 12"/>
+          <p:cNvSpPr>
+            <a:spLocks noGrp="1"/>
+          </p:cNvSpPr>
+          <p:nvPr>
+            <p:ph type="body" idx="1"/>
+          </p:nvPr>
+        </p:nvSpPr>
+        <p:spPr/>
+        <p:txBody>
+          <a:bodyPr>
+            <a:normAutofit/>
+          </a:bodyPr>
+          <a:lstStyle/>
+          <a:p>
+            <a:r>
+              <a:rPr lang="en-US" sz="2800" dirty="0" smtClean="0"/>
+              <a:t>Deterministic model</a:t>
+            </a:r>
+            <a:endParaRPr lang="he-IL" sz="2800" dirty="0"/>
+          </a:p>
+        </p:txBody>
+      </p:sp>
+      <p:sp>
+        <p:nvSpPr>
+          <p:cNvPr id="3" name="Content Placeholder 2"/>
+          <p:cNvSpPr>
+            <a:spLocks noGrp="1"/>
+          </p:cNvSpPr>
+          <p:nvPr>
+            <p:ph sz="half" idx="2"/>
+          </p:nvPr>
+        </p:nvSpPr>
+        <p:spPr/>
+        <p:txBody>
+          <a:bodyPr>
+            <a:normAutofit/>
+          </a:bodyPr>
+          <a:lstStyle/>
+          <a:p>
+            <a:pPr algn="l" rtl="0"/>
+            <a:r>
+              <a:rPr lang="en-US" sz="2800" dirty="0" smtClean="0"/>
+              <a:t>Constant environment</a:t>
+            </a:r>
+          </a:p>
+          <a:p>
+            <a:pPr algn="l" rtl="0"/>
+            <a:r>
+              <a:rPr lang="en-US" sz="2800" dirty="0" smtClean="0"/>
+              <a:t>Infinite homogenous populations</a:t>
+            </a:r>
+          </a:p>
+          <a:p>
+            <a:pPr algn="l" rtl="0"/>
+            <a:r>
+              <a:rPr lang="en-US" sz="2800" dirty="0" smtClean="0"/>
+              <a:t>Steady state analysis</a:t>
+            </a:r>
+          </a:p>
+          <a:p>
+            <a:pPr algn="l" rtl="0"/>
+            <a:r>
+              <a:rPr lang="en-US" sz="2800" dirty="0" smtClean="0"/>
+              <a:t>General solution</a:t>
+            </a:r>
+          </a:p>
+          <a:p>
+            <a:pPr marL="0" indent="0" algn="l" rtl="0">
+              <a:buNone/>
+            </a:pPr>
+            <a:endParaRPr lang="en-US" sz="2800" dirty="0"/>
+          </a:p>
+        </p:txBody>
+      </p:sp>
+      <p:sp>
+        <p:nvSpPr>
+          <p:cNvPr id="14" name="Text Placeholder 13"/>
+          <p:cNvSpPr>
+            <a:spLocks noGrp="1"/>
+          </p:cNvSpPr>
+          <p:nvPr>
+            <p:ph type="body" sz="quarter" idx="3"/>
+          </p:nvPr>
+        </p:nvSpPr>
+        <p:spPr/>
+        <p:txBody>
+          <a:bodyPr>
+            <a:normAutofit/>
+          </a:bodyPr>
+          <a:lstStyle/>
+          <a:p>
+            <a:r>
+              <a:rPr lang="en-US" sz="2800" dirty="0" smtClean="0"/>
+              <a:t>Stochastic model</a:t>
+            </a:r>
+            <a:endParaRPr lang="he-IL" sz="2800" dirty="0"/>
+          </a:p>
+        </p:txBody>
+      </p:sp>
+      <p:sp>
+        <p:nvSpPr>
+          <p:cNvPr id="15" name="Content Placeholder 14"/>
+          <p:cNvSpPr>
+            <a:spLocks noGrp="1"/>
+          </p:cNvSpPr>
+          <p:nvPr>
+            <p:ph sz="quarter" idx="4"/>
+          </p:nvPr>
+        </p:nvSpPr>
+        <p:spPr/>
+        <p:txBody>
+          <a:bodyPr/>
+          <a:lstStyle/>
+          <a:p>
+            <a:pPr algn="l" rtl="0"/>
+            <a:r>
+              <a:rPr lang="en-US" sz="2800" dirty="0"/>
+              <a:t>Changing environment</a:t>
+            </a:r>
+          </a:p>
+          <a:p>
+            <a:pPr algn="l" rtl="0"/>
+            <a:r>
+              <a:rPr lang="en-US" sz="2800" dirty="0"/>
+              <a:t>Finite populations</a:t>
+            </a:r>
+          </a:p>
+          <a:p>
+            <a:pPr algn="l" rtl="0"/>
+            <a:r>
+              <a:rPr lang="en-US" sz="2800" dirty="0"/>
+              <a:t>Competitions between mutational </a:t>
+            </a:r>
+            <a:r>
+              <a:rPr lang="en-US" sz="2800" dirty="0" smtClean="0"/>
+              <a:t>strategies</a:t>
+            </a:r>
+          </a:p>
+          <a:p>
+            <a:pPr algn="l" rtl="0"/>
+            <a:r>
+              <a:rPr lang="en-US" sz="2800" dirty="0" smtClean="0"/>
+              <a:t>Fixation and extinction</a:t>
+            </a:r>
+          </a:p>
+          <a:p>
+            <a:pPr algn="l" rtl="0"/>
+            <a:r>
+              <a:rPr lang="en-US" sz="2800" dirty="0" smtClean="0"/>
+              <a:t>Simulations</a:t>
+            </a:r>
+          </a:p>
+        </p:txBody>
+      </p:sp>
+      <p:sp>
+        <p:nvSpPr>
+          <p:cNvPr id="4" name="Date Placeholder 3"/>
+          <p:cNvSpPr>
+            <a:spLocks noGrp="1"/>
+          </p:cNvSpPr>
+          <p:nvPr>
+            <p:ph type="dt" sz="half" idx="10"/>
+          </p:nvPr>
+        </p:nvSpPr>
+        <p:spPr/>
+        <p:txBody>
+          <a:bodyPr/>
+          <a:lstStyle/>
+          <a:p>
+            <a:pPr rtl="0"/>
+            <a:r>
+              <a:rPr lang="he-IL" dirty="0" smtClean="0"/>
+              <a:t>SIDEER 2013</a:t>
+            </a:r>
+            <a:endParaRPr lang="he-IL" dirty="0"/>
+          </a:p>
+        </p:txBody>
+      </p:sp>
+      <p:sp>
+        <p:nvSpPr>
+          <p:cNvPr id="5" name="Footer Placeholder 4"/>
+          <p:cNvSpPr>
+            <a:spLocks noGrp="1"/>
+          </p:cNvSpPr>
+          <p:nvPr>
+            <p:ph type="ftr" sz="quarter" idx="11"/>
+          </p:nvPr>
+        </p:nvSpPr>
+        <p:spPr/>
+        <p:txBody>
+          <a:bodyPr/>
+          <a:lstStyle/>
+          <a:p>
+            <a:pPr algn="l"/>
+            <a:r>
+              <a:rPr lang="en-US" dirty="0" err="1" smtClean="0"/>
+              <a:t>Yoav</a:t>
+            </a:r>
+            <a:r>
+              <a:rPr lang="en-US" dirty="0" smtClean="0"/>
+              <a:t> Ram</a:t>
+            </a:r>
+            <a:endParaRPr lang="he-IL" dirty="0"/>
+          </a:p>
+        </p:txBody>
+      </p:sp>
+      <p:sp>
+        <p:nvSpPr>
+          <p:cNvPr id="6" name="Slide Number Placeholder 5"/>
+          <p:cNvSpPr>
+            <a:spLocks noGrp="1"/>
+          </p:cNvSpPr>
+          <p:nvPr>
+            <p:ph type="sldNum" sz="quarter" idx="12"/>
+          </p:nvPr>
+        </p:nvSpPr>
+        <p:spPr/>
+        <p:txBody>
+          <a:bodyPr/>
+          <a:lstStyle/>
+          <a:p>
+            <a:pPr algn="r"/>
+            <a:fld id="{DDDA39DD-F56F-4D5B-9830-607597A41E0F}" type="slidenum">
+              <a:rPr lang="he-IL" smtClean="0"/>
+              <a:pPr algn="r"/>
+              <a:t>9</a:t>
+            </a:fld>
+            <a:endParaRPr lang="he-IL" dirty="0"/>
+          </a:p>
+        </p:txBody>
+      </p:sp>
+      <p:sp>
+        <p:nvSpPr>
+          <p:cNvPr id="16" name="Rectangle 15"/>
+          <p:cNvSpPr/>
+          <p:nvPr/>
+        </p:nvSpPr>
+        <p:spPr>
+          <a:xfrm>
+            <a:off x="5508104" y="6309320"/>
+            <a:ext cx="3386376" cy="369332"/>
+          </a:xfrm>
+          <a:prstGeom prst="rect">
+            <a:avLst/>
+          </a:prstGeom>
+        </p:spPr>
+        <p:txBody>
+          <a:bodyPr wrap="none">
+            <a:spAutoFit/>
+          </a:bodyPr>
+          <a:lstStyle/>
+          <a:p>
+            <a:pPr algn="l" rtl="0"/>
+            <a:r>
+              <a:rPr lang="en-US" dirty="0"/>
+              <a:t>Ram &amp; </a:t>
+            </a:r>
+            <a:r>
+              <a:rPr lang="en-US" dirty="0" err="1"/>
+              <a:t>Hadany</a:t>
+            </a:r>
+            <a:r>
+              <a:rPr lang="en-US" dirty="0"/>
+              <a:t>, </a:t>
+            </a:r>
+            <a:r>
+              <a:rPr lang="en-US" i="1" dirty="0"/>
+              <a:t>Evolution </a:t>
+            </a:r>
+            <a:r>
+              <a:rPr lang="en-US" dirty="0"/>
+              <a:t>2012</a:t>
+            </a:r>
+          </a:p>
+        </p:txBody>
+      </p:sp>
+    </p:spTree>
+    <p:extLst>
+      <p:ext uri="{BB962C8B-B14F-4D97-AF65-F5344CB8AC3E}">
+        <p14:creationId xmlns:p14="http://schemas.microsoft.com/office/powerpoint/2010/main" val="1439452293"/>
+      </p:ext>
+    </p:extLst>
+  </p:cSld>
+  <p:clrMapOvr>
+    <a:masterClrMapping/>
+  </p:clrMapOvr>
+  <p:timing>
+    <p:tnLst>
+      <p:par>
+        <p:cTn id="1" dur="indefinite" restart="never" nodeType="tmRoot"/>
+      </p:par>
+    </p:tnLst>
+  </p:timing>
 </p:sld>
 </file>
 

</xml_diff>